<commit_message>
Added algorithm to readme
</commit_message>
<xml_diff>
--- a/documentation/AlgorithmPresentation.pptx
+++ b/documentation/AlgorithmPresentation.pptx
@@ -6,6 +6,7 @@
   </p:sldMasterIdLst>
   <p:sldIdLst>
     <p:sldId id="256" r:id="rId2"/>
+    <p:sldId id="257" r:id="rId3"/>
   </p:sldIdLst>
   <p:sldSz cx="12192000" cy="6858000"/>
   <p:notesSz cx="6858000" cy="9144000"/>
@@ -104,6 +105,11 @@
       </a:defRPr>
     </a:lvl9pPr>
   </p:defaultTextStyle>
+  <p:extLst>
+    <p:ext uri="{EFAFB233-063F-42B5-8137-9DF3F51BA10A}">
+      <p15:sldGuideLst xmlns:p15="http://schemas.microsoft.com/office/powerpoint/2012/main"/>
+    </p:ext>
+  </p:extLst>
 </p:presentation>
 </file>
 
@@ -256,7 +262,7 @@
           <a:p>
             <a:fld id="{87DF8740-4EA4-4A2F-A75C-997B6157C895}" type="datetimeFigureOut">
               <a:rPr lang="it-IT" smtClean="0"/>
-              <a:t>08/05/2021</a:t>
+              <a:t>08/07/2021</a:t>
             </a:fld>
             <a:endParaRPr lang="it-IT"/>
           </a:p>
@@ -456,7 +462,7 @@
           <a:p>
             <a:fld id="{87DF8740-4EA4-4A2F-A75C-997B6157C895}" type="datetimeFigureOut">
               <a:rPr lang="it-IT" smtClean="0"/>
-              <a:t>08/05/2021</a:t>
+              <a:t>08/07/2021</a:t>
             </a:fld>
             <a:endParaRPr lang="it-IT"/>
           </a:p>
@@ -666,7 +672,7 @@
           <a:p>
             <a:fld id="{87DF8740-4EA4-4A2F-A75C-997B6157C895}" type="datetimeFigureOut">
               <a:rPr lang="it-IT" smtClean="0"/>
-              <a:t>08/05/2021</a:t>
+              <a:t>08/07/2021</a:t>
             </a:fld>
             <a:endParaRPr lang="it-IT"/>
           </a:p>
@@ -866,7 +872,7 @@
           <a:p>
             <a:fld id="{87DF8740-4EA4-4A2F-A75C-997B6157C895}" type="datetimeFigureOut">
               <a:rPr lang="it-IT" smtClean="0"/>
-              <a:t>08/05/2021</a:t>
+              <a:t>08/07/2021</a:t>
             </a:fld>
             <a:endParaRPr lang="it-IT"/>
           </a:p>
@@ -1142,7 +1148,7 @@
           <a:p>
             <a:fld id="{87DF8740-4EA4-4A2F-A75C-997B6157C895}" type="datetimeFigureOut">
               <a:rPr lang="it-IT" smtClean="0"/>
-              <a:t>08/05/2021</a:t>
+              <a:t>08/07/2021</a:t>
             </a:fld>
             <a:endParaRPr lang="it-IT"/>
           </a:p>
@@ -1410,7 +1416,7 @@
           <a:p>
             <a:fld id="{87DF8740-4EA4-4A2F-A75C-997B6157C895}" type="datetimeFigureOut">
               <a:rPr lang="it-IT" smtClean="0"/>
-              <a:t>08/05/2021</a:t>
+              <a:t>08/07/2021</a:t>
             </a:fld>
             <a:endParaRPr lang="it-IT"/>
           </a:p>
@@ -1825,7 +1831,7 @@
           <a:p>
             <a:fld id="{87DF8740-4EA4-4A2F-A75C-997B6157C895}" type="datetimeFigureOut">
               <a:rPr lang="it-IT" smtClean="0"/>
-              <a:t>08/05/2021</a:t>
+              <a:t>08/07/2021</a:t>
             </a:fld>
             <a:endParaRPr lang="it-IT"/>
           </a:p>
@@ -1967,7 +1973,7 @@
           <a:p>
             <a:fld id="{87DF8740-4EA4-4A2F-A75C-997B6157C895}" type="datetimeFigureOut">
               <a:rPr lang="it-IT" smtClean="0"/>
-              <a:t>08/05/2021</a:t>
+              <a:t>08/07/2021</a:t>
             </a:fld>
             <a:endParaRPr lang="it-IT"/>
           </a:p>
@@ -2080,7 +2086,7 @@
           <a:p>
             <a:fld id="{87DF8740-4EA4-4A2F-A75C-997B6157C895}" type="datetimeFigureOut">
               <a:rPr lang="it-IT" smtClean="0"/>
-              <a:t>08/05/2021</a:t>
+              <a:t>08/07/2021</a:t>
             </a:fld>
             <a:endParaRPr lang="it-IT"/>
           </a:p>
@@ -2393,7 +2399,7 @@
           <a:p>
             <a:fld id="{87DF8740-4EA4-4A2F-A75C-997B6157C895}" type="datetimeFigureOut">
               <a:rPr lang="it-IT" smtClean="0"/>
-              <a:t>08/05/2021</a:t>
+              <a:t>08/07/2021</a:t>
             </a:fld>
             <a:endParaRPr lang="it-IT"/>
           </a:p>
@@ -2682,7 +2688,7 @@
           <a:p>
             <a:fld id="{87DF8740-4EA4-4A2F-A75C-997B6157C895}" type="datetimeFigureOut">
               <a:rPr lang="it-IT" smtClean="0"/>
-              <a:t>08/05/2021</a:t>
+              <a:t>08/07/2021</a:t>
             </a:fld>
             <a:endParaRPr lang="it-IT"/>
           </a:p>
@@ -2925,7 +2931,7 @@
           <a:p>
             <a:fld id="{87DF8740-4EA4-4A2F-A75C-997B6157C895}" type="datetimeFigureOut">
               <a:rPr lang="it-IT" smtClean="0"/>
-              <a:t>08/05/2021</a:t>
+              <a:t>08/07/2021</a:t>
             </a:fld>
             <a:endParaRPr lang="it-IT"/>
           </a:p>
@@ -7006,6 +7012,3415 @@
 </p:sld>
 </file>
 
+<file path=ppt/slides/slide2.xml><?xml version="1.0" encoding="utf-8"?>
+<p:sld xmlns:a="http://schemas.openxmlformats.org/drawingml/2006/main" xmlns:r="http://schemas.openxmlformats.org/officeDocument/2006/relationships" xmlns:p="http://schemas.openxmlformats.org/presentationml/2006/main">
+  <p:cSld>
+    <p:spTree>
+      <p:nvGrpSpPr>
+        <p:cNvPr id="1" name=""/>
+        <p:cNvGrpSpPr/>
+        <p:nvPr/>
+      </p:nvGrpSpPr>
+      <p:grpSpPr>
+        <a:xfrm>
+          <a:off x="0" y="0"/>
+          <a:ext cx="0" cy="0"/>
+          <a:chOff x="0" y="0"/>
+          <a:chExt cx="0" cy="0"/>
+        </a:xfrm>
+      </p:grpSpPr>
+      <p:graphicFrame>
+        <p:nvGraphicFramePr>
+          <p:cNvPr id="5" name="Table 4">
+            <a:extLst>
+              <a:ext uri="{FF2B5EF4-FFF2-40B4-BE49-F238E27FC236}">
+                <a16:creationId xmlns:a16="http://schemas.microsoft.com/office/drawing/2014/main" id="{CEF8B636-D692-429D-89F0-E2A4BB3D74A1}"/>
+              </a:ext>
+            </a:extLst>
+          </p:cNvPr>
+          <p:cNvGraphicFramePr>
+            <a:graphicFrameLocks noGrp="1"/>
+          </p:cNvGraphicFramePr>
+          <p:nvPr>
+            <p:extLst>
+              <p:ext uri="{D42A27DB-BD31-4B8C-83A1-F6EECF244321}">
+                <p14:modId xmlns:p14="http://schemas.microsoft.com/office/powerpoint/2010/main" val="4167740141"/>
+              </p:ext>
+            </p:extLst>
+          </p:nvPr>
+        </p:nvGraphicFramePr>
+        <p:xfrm>
+          <a:off x="2677953" y="1880358"/>
+          <a:ext cx="6804000" cy="2736000"/>
+        </p:xfrm>
+        <a:graphic>
+          <a:graphicData uri="http://schemas.openxmlformats.org/drawingml/2006/table">
+            <a:tbl>
+              <a:tblPr>
+                <a:tableStyleId>{5C22544A-7EE6-4342-B048-85BDC9FD1C3A}</a:tableStyleId>
+              </a:tblPr>
+              <a:tblGrid>
+                <a:gridCol w="756000">
+                  <a:extLst>
+                    <a:ext uri="{9D8B030D-6E8A-4147-A177-3AD203B41FA5}">
+                      <a16:colId xmlns:a16="http://schemas.microsoft.com/office/drawing/2014/main" val="3304498387"/>
+                    </a:ext>
+                  </a:extLst>
+                </a:gridCol>
+                <a:gridCol w="756000">
+                  <a:extLst>
+                    <a:ext uri="{9D8B030D-6E8A-4147-A177-3AD203B41FA5}">
+                      <a16:colId xmlns:a16="http://schemas.microsoft.com/office/drawing/2014/main" val="2562443958"/>
+                    </a:ext>
+                  </a:extLst>
+                </a:gridCol>
+                <a:gridCol w="756000">
+                  <a:extLst>
+                    <a:ext uri="{9D8B030D-6E8A-4147-A177-3AD203B41FA5}">
+                      <a16:colId xmlns:a16="http://schemas.microsoft.com/office/drawing/2014/main" val="599452531"/>
+                    </a:ext>
+                  </a:extLst>
+                </a:gridCol>
+                <a:gridCol w="756000">
+                  <a:extLst>
+                    <a:ext uri="{9D8B030D-6E8A-4147-A177-3AD203B41FA5}">
+                      <a16:colId xmlns:a16="http://schemas.microsoft.com/office/drawing/2014/main" val="3987730942"/>
+                    </a:ext>
+                  </a:extLst>
+                </a:gridCol>
+                <a:gridCol w="756000">
+                  <a:extLst>
+                    <a:ext uri="{9D8B030D-6E8A-4147-A177-3AD203B41FA5}">
+                      <a16:colId xmlns:a16="http://schemas.microsoft.com/office/drawing/2014/main" val="243858316"/>
+                    </a:ext>
+                  </a:extLst>
+                </a:gridCol>
+                <a:gridCol w="756000">
+                  <a:extLst>
+                    <a:ext uri="{9D8B030D-6E8A-4147-A177-3AD203B41FA5}">
+                      <a16:colId xmlns:a16="http://schemas.microsoft.com/office/drawing/2014/main" val="3733742466"/>
+                    </a:ext>
+                  </a:extLst>
+                </a:gridCol>
+                <a:gridCol w="756000">
+                  <a:extLst>
+                    <a:ext uri="{9D8B030D-6E8A-4147-A177-3AD203B41FA5}">
+                      <a16:colId xmlns:a16="http://schemas.microsoft.com/office/drawing/2014/main" val="2550096102"/>
+                    </a:ext>
+                  </a:extLst>
+                </a:gridCol>
+                <a:gridCol w="756000">
+                  <a:extLst>
+                    <a:ext uri="{9D8B030D-6E8A-4147-A177-3AD203B41FA5}">
+                      <a16:colId xmlns:a16="http://schemas.microsoft.com/office/drawing/2014/main" val="2435900465"/>
+                    </a:ext>
+                  </a:extLst>
+                </a:gridCol>
+                <a:gridCol w="756000">
+                  <a:extLst>
+                    <a:ext uri="{9D8B030D-6E8A-4147-A177-3AD203B41FA5}">
+                      <a16:colId xmlns:a16="http://schemas.microsoft.com/office/drawing/2014/main" val="2807255029"/>
+                    </a:ext>
+                  </a:extLst>
+                </a:gridCol>
+              </a:tblGrid>
+              <a:tr h="684000">
+                <a:tc>
+                  <a:txBody>
+                    <a:bodyPr/>
+                    <a:lstStyle/>
+                    <a:p>
+                      <a:pPr algn="ctr" fontAlgn="b"/>
+                      <a:r>
+                        <a:rPr lang="en-US" sz="1100" b="1" u="none" strike="noStrike" dirty="0">
+                          <a:solidFill>
+                            <a:srgbClr val="FB0169"/>
+                          </a:solidFill>
+                          <a:effectLst/>
+                          <a:latin typeface="Consolas" panose="020B0609020204030204" pitchFamily="49" charset="0"/>
+                        </a:rPr>
+                        <a:t>sensor 0</a:t>
+                      </a:r>
+                      <a:br>
+                        <a:rPr lang="en-US" sz="1100" b="1" u="none" strike="noStrike" dirty="0">
+                          <a:effectLst/>
+                          <a:latin typeface="Consolas" panose="020B0609020204030204" pitchFamily="49" charset="0"/>
+                        </a:rPr>
+                      </a:br>
+                      <a:r>
+                        <a:rPr lang="en-US" sz="1100" b="1" u="none" strike="noStrike" dirty="0">
+                          <a:solidFill>
+                            <a:srgbClr val="C68C18"/>
+                          </a:solidFill>
+                          <a:effectLst/>
+                          <a:latin typeface="Consolas" panose="020B0609020204030204" pitchFamily="49" charset="0"/>
+                        </a:rPr>
+                        <a:t>group 0</a:t>
+                      </a:r>
+                      <a:br>
+                        <a:rPr lang="en-US" sz="1100" b="1" u="none" strike="noStrike" dirty="0">
+                          <a:effectLst/>
+                          <a:latin typeface="Consolas" panose="020B0609020204030204" pitchFamily="49" charset="0"/>
+                        </a:rPr>
+                      </a:br>
+                      <a:r>
+                        <a:rPr lang="en-US" sz="1100" b="1" u="none" strike="noStrike" dirty="0">
+                          <a:effectLst/>
+                          <a:latin typeface="Consolas" panose="020B0609020204030204" pitchFamily="49" charset="0"/>
+                        </a:rPr>
+                        <a:t>pos 0</a:t>
+                      </a:r>
+                      <a:endParaRPr lang="en-US" sz="1100" b="1" i="0" u="none" strike="noStrike" dirty="0">
+                        <a:solidFill>
+                          <a:srgbClr val="000000"/>
+                        </a:solidFill>
+                        <a:effectLst/>
+                        <a:latin typeface="Consolas" panose="020B0609020204030204" pitchFamily="49" charset="0"/>
+                      </a:endParaRPr>
+                    </a:p>
+                  </a:txBody>
+                  <a:tcPr marL="9525" marR="9525" marT="9525" marB="0" anchor="ctr">
+                    <a:lnL w="28575" cap="flat" cmpd="sng" algn="ctr">
+                      <a:solidFill>
+                        <a:schemeClr val="tx1"/>
+                      </a:solidFill>
+                      <a:prstDash val="solid"/>
+                      <a:round/>
+                      <a:headEnd type="none" w="med" len="med"/>
+                      <a:tailEnd type="none" w="med" len="med"/>
+                    </a:lnL>
+                    <a:lnR w="28575" cap="flat" cmpd="sng" algn="ctr">
+                      <a:solidFill>
+                        <a:schemeClr val="tx1"/>
+                      </a:solidFill>
+                      <a:prstDash val="solid"/>
+                      <a:round/>
+                      <a:headEnd type="none" w="med" len="med"/>
+                      <a:tailEnd type="none" w="med" len="med"/>
+                    </a:lnR>
+                    <a:lnT w="28575" cap="flat" cmpd="sng" algn="ctr">
+                      <a:solidFill>
+                        <a:schemeClr val="tx1"/>
+                      </a:solidFill>
+                      <a:prstDash val="solid"/>
+                      <a:round/>
+                      <a:headEnd type="none" w="med" len="med"/>
+                      <a:tailEnd type="none" w="med" len="med"/>
+                    </a:lnT>
+                    <a:lnB w="28575" cap="flat" cmpd="sng" algn="ctr">
+                      <a:solidFill>
+                        <a:schemeClr val="tx1"/>
+                      </a:solidFill>
+                      <a:prstDash val="solid"/>
+                      <a:round/>
+                      <a:headEnd type="none" w="med" len="med"/>
+                      <a:tailEnd type="none" w="med" len="med"/>
+                    </a:lnB>
+                    <a:lnTlToBr w="12700" cmpd="sng">
+                      <a:noFill/>
+                      <a:prstDash val="solid"/>
+                    </a:lnTlToBr>
+                    <a:lnBlToTr w="12700" cmpd="sng">
+                      <a:noFill/>
+                      <a:prstDash val="solid"/>
+                    </a:lnBlToTr>
+                    <a:noFill/>
+                  </a:tcPr>
+                </a:tc>
+                <a:tc>
+                  <a:txBody>
+                    <a:bodyPr/>
+                    <a:lstStyle/>
+                    <a:p>
+                      <a:pPr algn="ctr" fontAlgn="b"/>
+                      <a:r>
+                        <a:rPr lang="en-US" sz="1100" b="1" u="none" strike="noStrike" dirty="0">
+                          <a:solidFill>
+                            <a:srgbClr val="FB0169"/>
+                          </a:solidFill>
+                          <a:effectLst/>
+                          <a:latin typeface="Consolas" panose="020B0609020204030204" pitchFamily="49" charset="0"/>
+                        </a:rPr>
+                        <a:t>sensor 0</a:t>
+                      </a:r>
+                      <a:br>
+                        <a:rPr lang="en-US" sz="1100" b="1" u="none" strike="noStrike" dirty="0">
+                          <a:solidFill>
+                            <a:srgbClr val="FB0169"/>
+                          </a:solidFill>
+                          <a:effectLst/>
+                          <a:latin typeface="Consolas" panose="020B0609020204030204" pitchFamily="49" charset="0"/>
+                        </a:rPr>
+                      </a:br>
+                      <a:r>
+                        <a:rPr lang="en-US" sz="1100" b="1" u="none" strike="noStrike" dirty="0">
+                          <a:solidFill>
+                            <a:srgbClr val="C68C18"/>
+                          </a:solidFill>
+                          <a:effectLst/>
+                          <a:latin typeface="Consolas" panose="020B0609020204030204" pitchFamily="49" charset="0"/>
+                        </a:rPr>
+                        <a:t>group 0</a:t>
+                      </a:r>
+                      <a:br>
+                        <a:rPr lang="en-US" sz="1100" b="1" u="none" strike="noStrike" dirty="0">
+                          <a:effectLst/>
+                          <a:latin typeface="Consolas" panose="020B0609020204030204" pitchFamily="49" charset="0"/>
+                        </a:rPr>
+                      </a:br>
+                      <a:r>
+                        <a:rPr lang="en-US" sz="1100" b="1" u="none" strike="noStrike" dirty="0">
+                          <a:effectLst/>
+                          <a:latin typeface="Consolas" panose="020B0609020204030204" pitchFamily="49" charset="0"/>
+                        </a:rPr>
+                        <a:t>pos 1</a:t>
+                      </a:r>
+                      <a:endParaRPr lang="en-US" sz="1100" b="1" i="0" u="none" strike="noStrike" dirty="0">
+                        <a:solidFill>
+                          <a:srgbClr val="000000"/>
+                        </a:solidFill>
+                        <a:effectLst/>
+                        <a:latin typeface="Consolas" panose="020B0609020204030204" pitchFamily="49" charset="0"/>
+                      </a:endParaRPr>
+                    </a:p>
+                  </a:txBody>
+                  <a:tcPr marL="9525" marR="9525" marT="9525" marB="0" anchor="ctr">
+                    <a:lnL w="28575" cap="flat" cmpd="sng" algn="ctr">
+                      <a:solidFill>
+                        <a:schemeClr val="tx1"/>
+                      </a:solidFill>
+                      <a:prstDash val="solid"/>
+                      <a:round/>
+                      <a:headEnd type="none" w="med" len="med"/>
+                      <a:tailEnd type="none" w="med" len="med"/>
+                    </a:lnL>
+                    <a:lnR w="28575" cap="flat" cmpd="sng" algn="ctr">
+                      <a:solidFill>
+                        <a:schemeClr val="tx1"/>
+                      </a:solidFill>
+                      <a:prstDash val="solid"/>
+                      <a:round/>
+                      <a:headEnd type="none" w="med" len="med"/>
+                      <a:tailEnd type="none" w="med" len="med"/>
+                    </a:lnR>
+                    <a:lnT w="28575" cap="flat" cmpd="sng" algn="ctr">
+                      <a:solidFill>
+                        <a:schemeClr val="tx1"/>
+                      </a:solidFill>
+                      <a:prstDash val="solid"/>
+                      <a:round/>
+                      <a:headEnd type="none" w="med" len="med"/>
+                      <a:tailEnd type="none" w="med" len="med"/>
+                    </a:lnT>
+                    <a:lnB w="28575" cap="flat" cmpd="sng" algn="ctr">
+                      <a:solidFill>
+                        <a:schemeClr val="tx1"/>
+                      </a:solidFill>
+                      <a:prstDash val="solid"/>
+                      <a:round/>
+                      <a:headEnd type="none" w="med" len="med"/>
+                      <a:tailEnd type="none" w="med" len="med"/>
+                    </a:lnB>
+                    <a:lnTlToBr w="12700" cmpd="sng">
+                      <a:noFill/>
+                      <a:prstDash val="solid"/>
+                    </a:lnTlToBr>
+                    <a:lnBlToTr w="12700" cmpd="sng">
+                      <a:noFill/>
+                      <a:prstDash val="solid"/>
+                    </a:lnBlToTr>
+                    <a:noFill/>
+                  </a:tcPr>
+                </a:tc>
+                <a:tc>
+                  <a:txBody>
+                    <a:bodyPr/>
+                    <a:lstStyle/>
+                    <a:p>
+                      <a:pPr algn="ctr" fontAlgn="b"/>
+                      <a:r>
+                        <a:rPr kumimoji="0" lang="it-IT" sz="1100" b="1" i="0" u="none" strike="noStrike" kern="1200" cap="none" spc="0" normalizeH="0" baseline="0" noProof="0">
+                          <a:ln>
+                            <a:noFill/>
+                          </a:ln>
+                          <a:solidFill>
+                            <a:prstClr val="black"/>
+                          </a:solidFill>
+                          <a:effectLst/>
+                          <a:uLnTx/>
+                          <a:uFillTx/>
+                          <a:latin typeface="Consolas" panose="020B0609020204030204" pitchFamily="49" charset="0"/>
+                          <a:ea typeface="+mn-ea"/>
+                          <a:cs typeface="+mn-cs"/>
+                        </a:rPr>
+                        <a:t>...</a:t>
+                      </a:r>
+                      <a:endParaRPr lang="it-IT" sz="1100" b="1" i="0" u="none" strike="noStrike">
+                        <a:solidFill>
+                          <a:srgbClr val="000000"/>
+                        </a:solidFill>
+                        <a:effectLst/>
+                        <a:latin typeface="Consolas" panose="020B0609020204030204" pitchFamily="49" charset="0"/>
+                      </a:endParaRPr>
+                    </a:p>
+                  </a:txBody>
+                  <a:tcPr marL="9525" marR="9525" marT="9525" marB="0" anchor="ctr">
+                    <a:lnL w="28575" cap="flat" cmpd="sng" algn="ctr">
+                      <a:solidFill>
+                        <a:schemeClr val="tx1"/>
+                      </a:solidFill>
+                      <a:prstDash val="solid"/>
+                      <a:round/>
+                      <a:headEnd type="none" w="med" len="med"/>
+                      <a:tailEnd type="none" w="med" len="med"/>
+                    </a:lnL>
+                    <a:lnR w="28575" cap="flat" cmpd="sng" algn="ctr">
+                      <a:solidFill>
+                        <a:schemeClr val="tx1"/>
+                      </a:solidFill>
+                      <a:prstDash val="solid"/>
+                      <a:round/>
+                      <a:headEnd type="none" w="med" len="med"/>
+                      <a:tailEnd type="none" w="med" len="med"/>
+                    </a:lnR>
+                    <a:lnT w="28575" cap="flat" cmpd="sng" algn="ctr">
+                      <a:solidFill>
+                        <a:schemeClr val="tx1"/>
+                      </a:solidFill>
+                      <a:prstDash val="solid"/>
+                      <a:round/>
+                      <a:headEnd type="none" w="med" len="med"/>
+                      <a:tailEnd type="none" w="med" len="med"/>
+                    </a:lnT>
+                    <a:lnB w="28575" cap="flat" cmpd="sng" algn="ctr">
+                      <a:solidFill>
+                        <a:schemeClr val="tx1"/>
+                      </a:solidFill>
+                      <a:prstDash val="solid"/>
+                      <a:round/>
+                      <a:headEnd type="none" w="med" len="med"/>
+                      <a:tailEnd type="none" w="med" len="med"/>
+                    </a:lnB>
+                    <a:lnTlToBr w="12700" cmpd="sng">
+                      <a:noFill/>
+                      <a:prstDash val="solid"/>
+                    </a:lnTlToBr>
+                    <a:lnBlToTr w="12700" cmpd="sng">
+                      <a:noFill/>
+                      <a:prstDash val="solid"/>
+                    </a:lnBlToTr>
+                    <a:noFill/>
+                  </a:tcPr>
+                </a:tc>
+                <a:tc>
+                  <a:txBody>
+                    <a:bodyPr/>
+                    <a:lstStyle/>
+                    <a:p>
+                      <a:pPr algn="ctr" fontAlgn="b"/>
+                      <a:r>
+                        <a:rPr lang="en-US" sz="1100" b="1" u="none" strike="noStrike" dirty="0">
+                          <a:solidFill>
+                            <a:srgbClr val="FB0169"/>
+                          </a:solidFill>
+                          <a:effectLst/>
+                          <a:latin typeface="Consolas" panose="020B0609020204030204" pitchFamily="49" charset="0"/>
+                        </a:rPr>
+                        <a:t>sensor 0</a:t>
+                      </a:r>
+                      <a:br>
+                        <a:rPr lang="en-US" sz="1100" b="1" u="none" strike="noStrike" dirty="0">
+                          <a:effectLst/>
+                          <a:latin typeface="Consolas" panose="020B0609020204030204" pitchFamily="49" charset="0"/>
+                        </a:rPr>
+                      </a:br>
+                      <a:r>
+                        <a:rPr lang="en-US" sz="1100" b="1" u="none" strike="noStrike" dirty="0">
+                          <a:solidFill>
+                            <a:srgbClr val="C68C18"/>
+                          </a:solidFill>
+                          <a:effectLst/>
+                          <a:latin typeface="Consolas" panose="020B0609020204030204" pitchFamily="49" charset="0"/>
+                        </a:rPr>
+                        <a:t>group 0</a:t>
+                      </a:r>
+                      <a:br>
+                        <a:rPr lang="en-US" sz="1100" b="1" u="none" strike="noStrike" dirty="0">
+                          <a:effectLst/>
+                          <a:latin typeface="Consolas" panose="020B0609020204030204" pitchFamily="49" charset="0"/>
+                        </a:rPr>
+                      </a:br>
+                      <a:r>
+                        <a:rPr lang="en-US" sz="1100" b="1" u="none" strike="noStrike" dirty="0">
+                          <a:effectLst/>
+                          <a:latin typeface="Consolas" panose="020B0609020204030204" pitchFamily="49" charset="0"/>
+                        </a:rPr>
+                        <a:t>pos last</a:t>
+                      </a:r>
+                      <a:endParaRPr lang="en-US" sz="1100" b="1" i="0" u="none" strike="noStrike" dirty="0">
+                        <a:solidFill>
+                          <a:srgbClr val="000000"/>
+                        </a:solidFill>
+                        <a:effectLst/>
+                        <a:latin typeface="Consolas" panose="020B0609020204030204" pitchFamily="49" charset="0"/>
+                      </a:endParaRPr>
+                    </a:p>
+                  </a:txBody>
+                  <a:tcPr marL="9525" marR="9525" marT="9525" marB="0" anchor="ctr">
+                    <a:lnL w="28575" cap="flat" cmpd="sng" algn="ctr">
+                      <a:solidFill>
+                        <a:schemeClr val="tx1"/>
+                      </a:solidFill>
+                      <a:prstDash val="solid"/>
+                      <a:round/>
+                      <a:headEnd type="none" w="med" len="med"/>
+                      <a:tailEnd type="none" w="med" len="med"/>
+                    </a:lnL>
+                    <a:lnR w="57150" cap="flat" cmpd="sng" algn="ctr">
+                      <a:solidFill>
+                        <a:schemeClr val="tx1"/>
+                      </a:solidFill>
+                      <a:prstDash val="solid"/>
+                      <a:round/>
+                      <a:headEnd type="none" w="med" len="med"/>
+                      <a:tailEnd type="none" w="med" len="med"/>
+                    </a:lnR>
+                    <a:lnT w="28575" cap="flat" cmpd="sng" algn="ctr">
+                      <a:solidFill>
+                        <a:schemeClr val="tx1"/>
+                      </a:solidFill>
+                      <a:prstDash val="solid"/>
+                      <a:round/>
+                      <a:headEnd type="none" w="med" len="med"/>
+                      <a:tailEnd type="none" w="med" len="med"/>
+                    </a:lnT>
+                    <a:lnB w="28575" cap="flat" cmpd="sng" algn="ctr">
+                      <a:solidFill>
+                        <a:schemeClr val="tx1"/>
+                      </a:solidFill>
+                      <a:prstDash val="solid"/>
+                      <a:round/>
+                      <a:headEnd type="none" w="med" len="med"/>
+                      <a:tailEnd type="none" w="med" len="med"/>
+                    </a:lnB>
+                    <a:lnTlToBr w="12700" cmpd="sng">
+                      <a:noFill/>
+                      <a:prstDash val="solid"/>
+                    </a:lnTlToBr>
+                    <a:lnBlToTr w="12700" cmpd="sng">
+                      <a:noFill/>
+                      <a:prstDash val="solid"/>
+                    </a:lnBlToTr>
+                    <a:noFill/>
+                  </a:tcPr>
+                </a:tc>
+                <a:tc>
+                  <a:txBody>
+                    <a:bodyPr/>
+                    <a:lstStyle/>
+                    <a:p>
+                      <a:pPr algn="ctr" fontAlgn="b"/>
+                      <a:r>
+                        <a:rPr lang="en-US" sz="1100" b="1" u="none" strike="noStrike" dirty="0">
+                          <a:solidFill>
+                            <a:srgbClr val="46B5C0"/>
+                          </a:solidFill>
+                          <a:effectLst/>
+                          <a:latin typeface="Consolas" panose="020B0609020204030204" pitchFamily="49" charset="0"/>
+                        </a:rPr>
+                        <a:t>sensor 1</a:t>
+                      </a:r>
+                      <a:br>
+                        <a:rPr lang="en-US" sz="1100" b="1" u="none" strike="noStrike" dirty="0">
+                          <a:effectLst/>
+                          <a:latin typeface="Consolas" panose="020B0609020204030204" pitchFamily="49" charset="0"/>
+                        </a:rPr>
+                      </a:br>
+                      <a:r>
+                        <a:rPr lang="en-US" sz="1100" b="1" u="none" strike="noStrike" dirty="0">
+                          <a:solidFill>
+                            <a:srgbClr val="C68C18"/>
+                          </a:solidFill>
+                          <a:effectLst/>
+                          <a:latin typeface="Consolas" panose="020B0609020204030204" pitchFamily="49" charset="0"/>
+                        </a:rPr>
+                        <a:t>group 0</a:t>
+                      </a:r>
+                      <a:br>
+                        <a:rPr lang="en-US" sz="1100" b="1" u="none" strike="noStrike" dirty="0">
+                          <a:effectLst/>
+                          <a:latin typeface="Consolas" panose="020B0609020204030204" pitchFamily="49" charset="0"/>
+                        </a:rPr>
+                      </a:br>
+                      <a:r>
+                        <a:rPr lang="en-US" sz="1100" b="1" u="none" strike="noStrike" dirty="0">
+                          <a:effectLst/>
+                          <a:latin typeface="Consolas" panose="020B0609020204030204" pitchFamily="49" charset="0"/>
+                        </a:rPr>
+                        <a:t>pos 0</a:t>
+                      </a:r>
+                      <a:endParaRPr lang="en-US" sz="1100" b="1" i="0" u="none" strike="noStrike" dirty="0">
+                        <a:solidFill>
+                          <a:srgbClr val="000000"/>
+                        </a:solidFill>
+                        <a:effectLst/>
+                        <a:latin typeface="Consolas" panose="020B0609020204030204" pitchFamily="49" charset="0"/>
+                      </a:endParaRPr>
+                    </a:p>
+                  </a:txBody>
+                  <a:tcPr marL="9525" marR="9525" marT="9525" marB="0" anchor="ctr">
+                    <a:lnL w="57150" cap="flat" cmpd="sng" algn="ctr">
+                      <a:solidFill>
+                        <a:schemeClr val="tx1"/>
+                      </a:solidFill>
+                      <a:prstDash val="solid"/>
+                      <a:round/>
+                      <a:headEnd type="none" w="med" len="med"/>
+                      <a:tailEnd type="none" w="med" len="med"/>
+                    </a:lnL>
+                    <a:lnR w="28575" cap="flat" cmpd="sng" algn="ctr">
+                      <a:solidFill>
+                        <a:schemeClr val="tx1"/>
+                      </a:solidFill>
+                      <a:prstDash val="solid"/>
+                      <a:round/>
+                      <a:headEnd type="none" w="med" len="med"/>
+                      <a:tailEnd type="none" w="med" len="med"/>
+                    </a:lnR>
+                    <a:lnT w="28575" cap="flat" cmpd="sng" algn="ctr">
+                      <a:solidFill>
+                        <a:schemeClr val="tx1"/>
+                      </a:solidFill>
+                      <a:prstDash val="solid"/>
+                      <a:round/>
+                      <a:headEnd type="none" w="med" len="med"/>
+                      <a:tailEnd type="none" w="med" len="med"/>
+                    </a:lnT>
+                    <a:lnB w="28575" cap="flat" cmpd="sng" algn="ctr">
+                      <a:solidFill>
+                        <a:schemeClr val="tx1"/>
+                      </a:solidFill>
+                      <a:prstDash val="solid"/>
+                      <a:round/>
+                      <a:headEnd type="none" w="med" len="med"/>
+                      <a:tailEnd type="none" w="med" len="med"/>
+                    </a:lnB>
+                    <a:lnTlToBr w="12700" cmpd="sng">
+                      <a:noFill/>
+                      <a:prstDash val="solid"/>
+                    </a:lnTlToBr>
+                    <a:lnBlToTr w="12700" cmpd="sng">
+                      <a:noFill/>
+                      <a:prstDash val="solid"/>
+                    </a:lnBlToTr>
+                    <a:noFill/>
+                  </a:tcPr>
+                </a:tc>
+                <a:tc>
+                  <a:txBody>
+                    <a:bodyPr/>
+                    <a:lstStyle/>
+                    <a:p>
+                      <a:pPr algn="ctr" fontAlgn="b"/>
+                      <a:r>
+                        <a:rPr lang="en-US" sz="1100" b="1" u="none" strike="noStrike" dirty="0">
+                          <a:solidFill>
+                            <a:srgbClr val="46B5C0"/>
+                          </a:solidFill>
+                          <a:effectLst/>
+                          <a:latin typeface="Consolas" panose="020B0609020204030204" pitchFamily="49" charset="0"/>
+                        </a:rPr>
+                        <a:t>sensor 1</a:t>
+                      </a:r>
+                      <a:br>
+                        <a:rPr lang="en-US" sz="1100" b="1" u="none" strike="noStrike" dirty="0">
+                          <a:effectLst/>
+                          <a:latin typeface="Consolas" panose="020B0609020204030204" pitchFamily="49" charset="0"/>
+                        </a:rPr>
+                      </a:br>
+                      <a:r>
+                        <a:rPr lang="en-US" sz="1100" b="1" u="none" strike="noStrike" dirty="0">
+                          <a:solidFill>
+                            <a:srgbClr val="C68C18"/>
+                          </a:solidFill>
+                          <a:effectLst/>
+                          <a:latin typeface="Consolas" panose="020B0609020204030204" pitchFamily="49" charset="0"/>
+                        </a:rPr>
+                        <a:t>group 0</a:t>
+                      </a:r>
+                      <a:br>
+                        <a:rPr lang="en-US" sz="1100" b="1" u="none" strike="noStrike" dirty="0">
+                          <a:effectLst/>
+                          <a:latin typeface="Consolas" panose="020B0609020204030204" pitchFamily="49" charset="0"/>
+                        </a:rPr>
+                      </a:br>
+                      <a:r>
+                        <a:rPr lang="en-US" sz="1100" b="1" u="none" strike="noStrike" dirty="0">
+                          <a:effectLst/>
+                          <a:latin typeface="Consolas" panose="020B0609020204030204" pitchFamily="49" charset="0"/>
+                        </a:rPr>
+                        <a:t>pos 1</a:t>
+                      </a:r>
+                      <a:endParaRPr lang="en-US" sz="1100" b="1" i="0" u="none" strike="noStrike" dirty="0">
+                        <a:solidFill>
+                          <a:srgbClr val="000000"/>
+                        </a:solidFill>
+                        <a:effectLst/>
+                        <a:latin typeface="Consolas" panose="020B0609020204030204" pitchFamily="49" charset="0"/>
+                      </a:endParaRPr>
+                    </a:p>
+                  </a:txBody>
+                  <a:tcPr marL="9525" marR="9525" marT="9525" marB="0" anchor="ctr">
+                    <a:lnL w="28575" cap="flat" cmpd="sng" algn="ctr">
+                      <a:solidFill>
+                        <a:schemeClr val="tx1"/>
+                      </a:solidFill>
+                      <a:prstDash val="solid"/>
+                      <a:round/>
+                      <a:headEnd type="none" w="med" len="med"/>
+                      <a:tailEnd type="none" w="med" len="med"/>
+                    </a:lnL>
+                    <a:lnR w="28575" cap="flat" cmpd="sng" algn="ctr">
+                      <a:solidFill>
+                        <a:schemeClr val="tx1"/>
+                      </a:solidFill>
+                      <a:prstDash val="solid"/>
+                      <a:round/>
+                      <a:headEnd type="none" w="med" len="med"/>
+                      <a:tailEnd type="none" w="med" len="med"/>
+                    </a:lnR>
+                    <a:lnT w="28575" cap="flat" cmpd="sng" algn="ctr">
+                      <a:solidFill>
+                        <a:schemeClr val="tx1"/>
+                      </a:solidFill>
+                      <a:prstDash val="solid"/>
+                      <a:round/>
+                      <a:headEnd type="none" w="med" len="med"/>
+                      <a:tailEnd type="none" w="med" len="med"/>
+                    </a:lnT>
+                    <a:lnB w="28575" cap="flat" cmpd="sng" algn="ctr">
+                      <a:solidFill>
+                        <a:schemeClr val="tx1"/>
+                      </a:solidFill>
+                      <a:prstDash val="solid"/>
+                      <a:round/>
+                      <a:headEnd type="none" w="med" len="med"/>
+                      <a:tailEnd type="none" w="med" len="med"/>
+                    </a:lnB>
+                    <a:lnTlToBr w="12700" cmpd="sng">
+                      <a:noFill/>
+                      <a:prstDash val="solid"/>
+                    </a:lnTlToBr>
+                    <a:lnBlToTr w="12700" cmpd="sng">
+                      <a:noFill/>
+                      <a:prstDash val="solid"/>
+                    </a:lnBlToTr>
+                    <a:noFill/>
+                  </a:tcPr>
+                </a:tc>
+                <a:tc>
+                  <a:txBody>
+                    <a:bodyPr/>
+                    <a:lstStyle/>
+                    <a:p>
+                      <a:pPr algn="ctr" fontAlgn="b"/>
+                      <a:r>
+                        <a:rPr lang="it-IT" sz="1100" b="1" u="none" strike="noStrike" dirty="0">
+                          <a:effectLst/>
+                          <a:latin typeface="Consolas" panose="020B0609020204030204" pitchFamily="49" charset="0"/>
+                        </a:rPr>
+                        <a:t>...</a:t>
+                      </a:r>
+                      <a:endParaRPr lang="it-IT" sz="1100" b="1" i="0" u="none" strike="noStrike" dirty="0">
+                        <a:solidFill>
+                          <a:srgbClr val="000000"/>
+                        </a:solidFill>
+                        <a:effectLst/>
+                        <a:latin typeface="Consolas" panose="020B0609020204030204" pitchFamily="49" charset="0"/>
+                      </a:endParaRPr>
+                    </a:p>
+                  </a:txBody>
+                  <a:tcPr marL="9525" marR="9525" marT="9525" marB="0" anchor="ctr">
+                    <a:lnL w="28575" cap="flat" cmpd="sng" algn="ctr">
+                      <a:solidFill>
+                        <a:schemeClr val="tx1"/>
+                      </a:solidFill>
+                      <a:prstDash val="solid"/>
+                      <a:round/>
+                      <a:headEnd type="none" w="med" len="med"/>
+                      <a:tailEnd type="none" w="med" len="med"/>
+                    </a:lnL>
+                    <a:lnR w="28575" cap="flat" cmpd="sng" algn="ctr">
+                      <a:solidFill>
+                        <a:schemeClr val="tx1"/>
+                      </a:solidFill>
+                      <a:prstDash val="solid"/>
+                      <a:round/>
+                      <a:headEnd type="none" w="med" len="med"/>
+                      <a:tailEnd type="none" w="med" len="med"/>
+                    </a:lnR>
+                    <a:lnT w="28575" cap="flat" cmpd="sng" algn="ctr">
+                      <a:solidFill>
+                        <a:schemeClr val="tx1"/>
+                      </a:solidFill>
+                      <a:prstDash val="solid"/>
+                      <a:round/>
+                      <a:headEnd type="none" w="med" len="med"/>
+                      <a:tailEnd type="none" w="med" len="med"/>
+                    </a:lnT>
+                    <a:lnB w="28575" cap="flat" cmpd="sng" algn="ctr">
+                      <a:solidFill>
+                        <a:schemeClr val="tx1"/>
+                      </a:solidFill>
+                      <a:prstDash val="solid"/>
+                      <a:round/>
+                      <a:headEnd type="none" w="med" len="med"/>
+                      <a:tailEnd type="none" w="med" len="med"/>
+                    </a:lnB>
+                    <a:lnTlToBr w="12700" cmpd="sng">
+                      <a:noFill/>
+                      <a:prstDash val="solid"/>
+                    </a:lnTlToBr>
+                    <a:lnBlToTr w="12700" cmpd="sng">
+                      <a:noFill/>
+                      <a:prstDash val="solid"/>
+                    </a:lnBlToTr>
+                    <a:noFill/>
+                  </a:tcPr>
+                </a:tc>
+                <a:tc>
+                  <a:txBody>
+                    <a:bodyPr/>
+                    <a:lstStyle/>
+                    <a:p>
+                      <a:pPr algn="ctr" fontAlgn="b"/>
+                      <a:r>
+                        <a:rPr lang="en-US" sz="1100" b="1" u="none" strike="noStrike" dirty="0">
+                          <a:solidFill>
+                            <a:srgbClr val="46B5C0"/>
+                          </a:solidFill>
+                          <a:effectLst/>
+                          <a:latin typeface="Consolas" panose="020B0609020204030204" pitchFamily="49" charset="0"/>
+                        </a:rPr>
+                        <a:t>sensor 1</a:t>
+                      </a:r>
+                      <a:br>
+                        <a:rPr lang="en-US" sz="1100" b="1" u="none" strike="noStrike" dirty="0">
+                          <a:effectLst/>
+                          <a:latin typeface="Consolas" panose="020B0609020204030204" pitchFamily="49" charset="0"/>
+                        </a:rPr>
+                      </a:br>
+                      <a:r>
+                        <a:rPr lang="en-US" sz="1100" b="1" u="none" strike="noStrike" dirty="0">
+                          <a:solidFill>
+                            <a:srgbClr val="C68C18"/>
+                          </a:solidFill>
+                          <a:effectLst/>
+                          <a:latin typeface="Consolas" panose="020B0609020204030204" pitchFamily="49" charset="0"/>
+                        </a:rPr>
+                        <a:t>group 0</a:t>
+                      </a:r>
+                      <a:br>
+                        <a:rPr lang="en-US" sz="1100" b="1" u="none" strike="noStrike" dirty="0">
+                          <a:effectLst/>
+                          <a:latin typeface="Consolas" panose="020B0609020204030204" pitchFamily="49" charset="0"/>
+                        </a:rPr>
+                      </a:br>
+                      <a:r>
+                        <a:rPr lang="en-US" sz="1100" b="1" u="none" strike="noStrike" dirty="0">
+                          <a:effectLst/>
+                          <a:latin typeface="Consolas" panose="020B0609020204030204" pitchFamily="49" charset="0"/>
+                        </a:rPr>
+                        <a:t>pos last</a:t>
+                      </a:r>
+                      <a:endParaRPr lang="en-US" sz="1100" b="1" i="0" u="none" strike="noStrike" dirty="0">
+                        <a:solidFill>
+                          <a:srgbClr val="000000"/>
+                        </a:solidFill>
+                        <a:effectLst/>
+                        <a:latin typeface="Consolas" panose="020B0609020204030204" pitchFamily="49" charset="0"/>
+                      </a:endParaRPr>
+                    </a:p>
+                  </a:txBody>
+                  <a:tcPr marL="9525" marR="9525" marT="9525" marB="0" anchor="ctr">
+                    <a:lnL w="28575" cap="flat" cmpd="sng" algn="ctr">
+                      <a:solidFill>
+                        <a:schemeClr val="tx1"/>
+                      </a:solidFill>
+                      <a:prstDash val="solid"/>
+                      <a:round/>
+                      <a:headEnd type="none" w="med" len="med"/>
+                      <a:tailEnd type="none" w="med" len="med"/>
+                    </a:lnL>
+                    <a:lnR w="28575" cap="flat" cmpd="sng" algn="ctr">
+                      <a:solidFill>
+                        <a:schemeClr val="tx1"/>
+                      </a:solidFill>
+                      <a:prstDash val="solid"/>
+                      <a:round/>
+                      <a:headEnd type="none" w="med" len="med"/>
+                      <a:tailEnd type="none" w="med" len="med"/>
+                    </a:lnR>
+                    <a:lnT w="28575" cap="flat" cmpd="sng" algn="ctr">
+                      <a:solidFill>
+                        <a:schemeClr val="tx1"/>
+                      </a:solidFill>
+                      <a:prstDash val="solid"/>
+                      <a:round/>
+                      <a:headEnd type="none" w="med" len="med"/>
+                      <a:tailEnd type="none" w="med" len="med"/>
+                    </a:lnT>
+                    <a:lnB w="28575" cap="flat" cmpd="sng" algn="ctr">
+                      <a:solidFill>
+                        <a:schemeClr val="tx1"/>
+                      </a:solidFill>
+                      <a:prstDash val="solid"/>
+                      <a:round/>
+                      <a:headEnd type="none" w="med" len="med"/>
+                      <a:tailEnd type="none" w="med" len="med"/>
+                    </a:lnB>
+                    <a:lnTlToBr w="12700" cmpd="sng">
+                      <a:noFill/>
+                      <a:prstDash val="solid"/>
+                    </a:lnTlToBr>
+                    <a:lnBlToTr w="12700" cmpd="sng">
+                      <a:noFill/>
+                      <a:prstDash val="solid"/>
+                    </a:lnBlToTr>
+                    <a:noFill/>
+                  </a:tcPr>
+                </a:tc>
+                <a:tc>
+                  <a:txBody>
+                    <a:bodyPr/>
+                    <a:lstStyle/>
+                    <a:p>
+                      <a:pPr algn="ctr" fontAlgn="b"/>
+                      <a:r>
+                        <a:rPr kumimoji="0" lang="it-IT" sz="1100" b="1" i="0" u="none" strike="noStrike" kern="1200" cap="none" spc="0" normalizeH="0" baseline="0" noProof="0">
+                          <a:ln>
+                            <a:noFill/>
+                          </a:ln>
+                          <a:solidFill>
+                            <a:prstClr val="black"/>
+                          </a:solidFill>
+                          <a:effectLst/>
+                          <a:uLnTx/>
+                          <a:uFillTx/>
+                          <a:latin typeface="Consolas" panose="020B0609020204030204" pitchFamily="49" charset="0"/>
+                          <a:ea typeface="+mn-ea"/>
+                          <a:cs typeface="+mn-cs"/>
+                        </a:rPr>
+                        <a:t>...</a:t>
+                      </a:r>
+                      <a:endParaRPr lang="it-IT" sz="1100" b="1" i="0" u="none" strike="noStrike" dirty="0">
+                        <a:solidFill>
+                          <a:srgbClr val="000000"/>
+                        </a:solidFill>
+                        <a:effectLst/>
+                        <a:latin typeface="Consolas" panose="020B0609020204030204" pitchFamily="49" charset="0"/>
+                      </a:endParaRPr>
+                    </a:p>
+                  </a:txBody>
+                  <a:tcPr marL="9525" marR="9525" marT="9525" marB="0" anchor="ctr">
+                    <a:lnL w="28575" cap="flat" cmpd="sng" algn="ctr">
+                      <a:solidFill>
+                        <a:schemeClr val="tx1"/>
+                      </a:solidFill>
+                      <a:prstDash val="solid"/>
+                      <a:round/>
+                      <a:headEnd type="none" w="med" len="med"/>
+                      <a:tailEnd type="none" w="med" len="med"/>
+                    </a:lnL>
+                    <a:lnR w="28575" cap="flat" cmpd="sng" algn="ctr">
+                      <a:solidFill>
+                        <a:schemeClr val="tx1"/>
+                      </a:solidFill>
+                      <a:prstDash val="solid"/>
+                      <a:round/>
+                      <a:headEnd type="none" w="med" len="med"/>
+                      <a:tailEnd type="none" w="med" len="med"/>
+                    </a:lnR>
+                    <a:lnT w="28575" cap="flat" cmpd="sng" algn="ctr">
+                      <a:solidFill>
+                        <a:schemeClr val="tx1"/>
+                      </a:solidFill>
+                      <a:prstDash val="solid"/>
+                      <a:round/>
+                      <a:headEnd type="none" w="med" len="med"/>
+                      <a:tailEnd type="none" w="med" len="med"/>
+                    </a:lnT>
+                    <a:lnB w="28575" cap="flat" cmpd="sng" algn="ctr">
+                      <a:solidFill>
+                        <a:schemeClr val="tx1"/>
+                      </a:solidFill>
+                      <a:prstDash val="solid"/>
+                      <a:round/>
+                      <a:headEnd type="none" w="med" len="med"/>
+                      <a:tailEnd type="none" w="med" len="med"/>
+                    </a:lnB>
+                    <a:lnTlToBr w="12700" cmpd="sng">
+                      <a:noFill/>
+                      <a:prstDash val="solid"/>
+                    </a:lnTlToBr>
+                    <a:lnBlToTr w="12700" cmpd="sng">
+                      <a:noFill/>
+                      <a:prstDash val="solid"/>
+                    </a:lnBlToTr>
+                    <a:noFill/>
+                  </a:tcPr>
+                </a:tc>
+                <a:extLst>
+                  <a:ext uri="{0D108BD9-81ED-4DB2-BD59-A6C34878D82A}">
+                    <a16:rowId xmlns:a16="http://schemas.microsoft.com/office/drawing/2014/main" val="3489742954"/>
+                  </a:ext>
+                </a:extLst>
+              </a:tr>
+              <a:tr h="684000">
+                <a:tc>
+                  <a:txBody>
+                    <a:bodyPr/>
+                    <a:lstStyle/>
+                    <a:p>
+                      <a:pPr algn="ctr" fontAlgn="b"/>
+                      <a:r>
+                        <a:rPr lang="en-US" sz="1100" b="1" u="none" strike="noStrike" dirty="0">
+                          <a:solidFill>
+                            <a:srgbClr val="FB0169"/>
+                          </a:solidFill>
+                          <a:effectLst/>
+                          <a:latin typeface="Consolas" panose="020B0609020204030204" pitchFamily="49" charset="0"/>
+                        </a:rPr>
+                        <a:t>sensor 0</a:t>
+                      </a:r>
+                      <a:br>
+                        <a:rPr lang="en-US" sz="1100" b="1" u="none" strike="noStrike" dirty="0">
+                          <a:effectLst/>
+                          <a:latin typeface="Consolas" panose="020B0609020204030204" pitchFamily="49" charset="0"/>
+                        </a:rPr>
+                      </a:br>
+                      <a:r>
+                        <a:rPr lang="en-US" sz="1100" b="1" u="none" strike="noStrike" dirty="0">
+                          <a:solidFill>
+                            <a:srgbClr val="82A021"/>
+                          </a:solidFill>
+                          <a:effectLst/>
+                          <a:latin typeface="Consolas" panose="020B0609020204030204" pitchFamily="49" charset="0"/>
+                        </a:rPr>
+                        <a:t>group 1</a:t>
+                      </a:r>
+                      <a:br>
+                        <a:rPr lang="en-US" sz="1100" b="1" u="none" strike="noStrike" dirty="0">
+                          <a:effectLst/>
+                          <a:latin typeface="Consolas" panose="020B0609020204030204" pitchFamily="49" charset="0"/>
+                        </a:rPr>
+                      </a:br>
+                      <a:r>
+                        <a:rPr lang="en-US" sz="1100" b="1" u="none" strike="noStrike" dirty="0">
+                          <a:effectLst/>
+                          <a:latin typeface="Consolas" panose="020B0609020204030204" pitchFamily="49" charset="0"/>
+                        </a:rPr>
+                        <a:t>pos 0</a:t>
+                      </a:r>
+                      <a:endParaRPr lang="en-US" sz="1100" b="1" i="0" u="none" strike="noStrike" dirty="0">
+                        <a:solidFill>
+                          <a:srgbClr val="000000"/>
+                        </a:solidFill>
+                        <a:effectLst/>
+                        <a:latin typeface="Consolas" panose="020B0609020204030204" pitchFamily="49" charset="0"/>
+                      </a:endParaRPr>
+                    </a:p>
+                  </a:txBody>
+                  <a:tcPr marL="9525" marR="9525" marT="9525" marB="0" anchor="ctr">
+                    <a:lnL w="28575" cap="flat" cmpd="sng" algn="ctr">
+                      <a:solidFill>
+                        <a:schemeClr val="tx1"/>
+                      </a:solidFill>
+                      <a:prstDash val="solid"/>
+                      <a:round/>
+                      <a:headEnd type="none" w="med" len="med"/>
+                      <a:tailEnd type="none" w="med" len="med"/>
+                    </a:lnL>
+                    <a:lnR w="28575" cap="flat" cmpd="sng" algn="ctr">
+                      <a:solidFill>
+                        <a:schemeClr val="tx1"/>
+                      </a:solidFill>
+                      <a:prstDash val="solid"/>
+                      <a:round/>
+                      <a:headEnd type="none" w="med" len="med"/>
+                      <a:tailEnd type="none" w="med" len="med"/>
+                    </a:lnR>
+                    <a:lnT w="28575" cap="flat" cmpd="sng" algn="ctr">
+                      <a:solidFill>
+                        <a:schemeClr val="tx1"/>
+                      </a:solidFill>
+                      <a:prstDash val="solid"/>
+                      <a:round/>
+                      <a:headEnd type="none" w="med" len="med"/>
+                      <a:tailEnd type="none" w="med" len="med"/>
+                    </a:lnT>
+                    <a:lnB w="28575" cap="flat" cmpd="sng" algn="ctr">
+                      <a:solidFill>
+                        <a:schemeClr val="tx1"/>
+                      </a:solidFill>
+                      <a:prstDash val="solid"/>
+                      <a:round/>
+                      <a:headEnd type="none" w="med" len="med"/>
+                      <a:tailEnd type="none" w="med" len="med"/>
+                    </a:lnB>
+                    <a:lnTlToBr w="12700" cmpd="sng">
+                      <a:noFill/>
+                      <a:prstDash val="solid"/>
+                    </a:lnTlToBr>
+                    <a:lnBlToTr w="12700" cmpd="sng">
+                      <a:noFill/>
+                      <a:prstDash val="solid"/>
+                    </a:lnBlToTr>
+                    <a:noFill/>
+                  </a:tcPr>
+                </a:tc>
+                <a:tc>
+                  <a:txBody>
+                    <a:bodyPr/>
+                    <a:lstStyle/>
+                    <a:p>
+                      <a:pPr algn="ctr" fontAlgn="b"/>
+                      <a:r>
+                        <a:rPr lang="en-US" sz="1100" b="1" u="none" strike="noStrike" dirty="0">
+                          <a:solidFill>
+                            <a:srgbClr val="FB0169"/>
+                          </a:solidFill>
+                          <a:effectLst/>
+                          <a:latin typeface="Consolas" panose="020B0609020204030204" pitchFamily="49" charset="0"/>
+                        </a:rPr>
+                        <a:t>sensor 0</a:t>
+                      </a:r>
+                      <a:br>
+                        <a:rPr lang="en-US" sz="1100" b="1" u="none" strike="noStrike" dirty="0">
+                          <a:effectLst/>
+                          <a:latin typeface="Consolas" panose="020B0609020204030204" pitchFamily="49" charset="0"/>
+                        </a:rPr>
+                      </a:br>
+                      <a:r>
+                        <a:rPr lang="en-US" sz="1100" b="1" u="none" strike="noStrike" dirty="0">
+                          <a:solidFill>
+                            <a:srgbClr val="82A021"/>
+                          </a:solidFill>
+                          <a:effectLst/>
+                          <a:latin typeface="Consolas" panose="020B0609020204030204" pitchFamily="49" charset="0"/>
+                        </a:rPr>
+                        <a:t>group 1</a:t>
+                      </a:r>
+                      <a:br>
+                        <a:rPr lang="en-US" sz="1100" b="1" u="none" strike="noStrike" dirty="0">
+                          <a:effectLst/>
+                          <a:latin typeface="Consolas" panose="020B0609020204030204" pitchFamily="49" charset="0"/>
+                        </a:rPr>
+                      </a:br>
+                      <a:r>
+                        <a:rPr lang="en-US" sz="1100" b="1" u="none" strike="noStrike" dirty="0">
+                          <a:effectLst/>
+                          <a:latin typeface="Consolas" panose="020B0609020204030204" pitchFamily="49" charset="0"/>
+                        </a:rPr>
+                        <a:t>pos 1</a:t>
+                      </a:r>
+                      <a:endParaRPr lang="en-US" sz="1100" b="1" i="0" u="none" strike="noStrike" dirty="0">
+                        <a:solidFill>
+                          <a:srgbClr val="000000"/>
+                        </a:solidFill>
+                        <a:effectLst/>
+                        <a:latin typeface="Consolas" panose="020B0609020204030204" pitchFamily="49" charset="0"/>
+                      </a:endParaRPr>
+                    </a:p>
+                  </a:txBody>
+                  <a:tcPr marL="9525" marR="9525" marT="9525" marB="0" anchor="ctr">
+                    <a:lnL w="28575" cap="flat" cmpd="sng" algn="ctr">
+                      <a:solidFill>
+                        <a:schemeClr val="tx1"/>
+                      </a:solidFill>
+                      <a:prstDash val="solid"/>
+                      <a:round/>
+                      <a:headEnd type="none" w="med" len="med"/>
+                      <a:tailEnd type="none" w="med" len="med"/>
+                    </a:lnL>
+                    <a:lnR w="28575" cap="flat" cmpd="sng" algn="ctr">
+                      <a:solidFill>
+                        <a:schemeClr val="tx1"/>
+                      </a:solidFill>
+                      <a:prstDash val="solid"/>
+                      <a:round/>
+                      <a:headEnd type="none" w="med" len="med"/>
+                      <a:tailEnd type="none" w="med" len="med"/>
+                    </a:lnR>
+                    <a:lnT w="28575" cap="flat" cmpd="sng" algn="ctr">
+                      <a:solidFill>
+                        <a:schemeClr val="tx1"/>
+                      </a:solidFill>
+                      <a:prstDash val="solid"/>
+                      <a:round/>
+                      <a:headEnd type="none" w="med" len="med"/>
+                      <a:tailEnd type="none" w="med" len="med"/>
+                    </a:lnT>
+                    <a:lnB w="28575" cap="flat" cmpd="sng" algn="ctr">
+                      <a:solidFill>
+                        <a:schemeClr val="tx1"/>
+                      </a:solidFill>
+                      <a:prstDash val="solid"/>
+                      <a:round/>
+                      <a:headEnd type="none" w="med" len="med"/>
+                      <a:tailEnd type="none" w="med" len="med"/>
+                    </a:lnB>
+                    <a:lnTlToBr w="12700" cmpd="sng">
+                      <a:noFill/>
+                      <a:prstDash val="solid"/>
+                    </a:lnTlToBr>
+                    <a:lnBlToTr w="12700" cmpd="sng">
+                      <a:noFill/>
+                      <a:prstDash val="solid"/>
+                    </a:lnBlToTr>
+                    <a:noFill/>
+                  </a:tcPr>
+                </a:tc>
+                <a:tc>
+                  <a:txBody>
+                    <a:bodyPr/>
+                    <a:lstStyle/>
+                    <a:p>
+                      <a:pPr algn="ctr" fontAlgn="b"/>
+                      <a:r>
+                        <a:rPr kumimoji="0" lang="it-IT" sz="1100" b="1" i="0" u="none" strike="noStrike" kern="1200" cap="none" spc="0" normalizeH="0" baseline="0" noProof="0">
+                          <a:ln>
+                            <a:noFill/>
+                          </a:ln>
+                          <a:solidFill>
+                            <a:prstClr val="black"/>
+                          </a:solidFill>
+                          <a:effectLst/>
+                          <a:uLnTx/>
+                          <a:uFillTx/>
+                          <a:latin typeface="Consolas" panose="020B0609020204030204" pitchFamily="49" charset="0"/>
+                          <a:ea typeface="+mn-ea"/>
+                          <a:cs typeface="+mn-cs"/>
+                        </a:rPr>
+                        <a:t>...</a:t>
+                      </a:r>
+                      <a:endParaRPr lang="it-IT" sz="1100" b="1" i="0" u="none" strike="noStrike" dirty="0">
+                        <a:solidFill>
+                          <a:srgbClr val="000000"/>
+                        </a:solidFill>
+                        <a:effectLst/>
+                        <a:latin typeface="Consolas" panose="020B0609020204030204" pitchFamily="49" charset="0"/>
+                      </a:endParaRPr>
+                    </a:p>
+                  </a:txBody>
+                  <a:tcPr marL="9525" marR="9525" marT="9525" marB="0" anchor="ctr">
+                    <a:lnL w="28575" cap="flat" cmpd="sng" algn="ctr">
+                      <a:solidFill>
+                        <a:schemeClr val="tx1"/>
+                      </a:solidFill>
+                      <a:prstDash val="solid"/>
+                      <a:round/>
+                      <a:headEnd type="none" w="med" len="med"/>
+                      <a:tailEnd type="none" w="med" len="med"/>
+                    </a:lnL>
+                    <a:lnR w="28575" cap="flat" cmpd="sng" algn="ctr">
+                      <a:solidFill>
+                        <a:schemeClr val="tx1"/>
+                      </a:solidFill>
+                      <a:prstDash val="solid"/>
+                      <a:round/>
+                      <a:headEnd type="none" w="med" len="med"/>
+                      <a:tailEnd type="none" w="med" len="med"/>
+                    </a:lnR>
+                    <a:lnT w="28575" cap="flat" cmpd="sng" algn="ctr">
+                      <a:solidFill>
+                        <a:schemeClr val="tx1"/>
+                      </a:solidFill>
+                      <a:prstDash val="solid"/>
+                      <a:round/>
+                      <a:headEnd type="none" w="med" len="med"/>
+                      <a:tailEnd type="none" w="med" len="med"/>
+                    </a:lnT>
+                    <a:lnB w="28575" cap="flat" cmpd="sng" algn="ctr">
+                      <a:solidFill>
+                        <a:schemeClr val="tx1"/>
+                      </a:solidFill>
+                      <a:prstDash val="solid"/>
+                      <a:round/>
+                      <a:headEnd type="none" w="med" len="med"/>
+                      <a:tailEnd type="none" w="med" len="med"/>
+                    </a:lnB>
+                    <a:lnTlToBr w="12700" cmpd="sng">
+                      <a:noFill/>
+                      <a:prstDash val="solid"/>
+                    </a:lnTlToBr>
+                    <a:lnBlToTr w="12700" cmpd="sng">
+                      <a:noFill/>
+                      <a:prstDash val="solid"/>
+                    </a:lnBlToTr>
+                    <a:noFill/>
+                  </a:tcPr>
+                </a:tc>
+                <a:tc>
+                  <a:txBody>
+                    <a:bodyPr/>
+                    <a:lstStyle/>
+                    <a:p>
+                      <a:pPr algn="ctr" fontAlgn="b"/>
+                      <a:r>
+                        <a:rPr lang="en-US" sz="1100" b="1" u="none" strike="noStrike" dirty="0">
+                          <a:solidFill>
+                            <a:srgbClr val="FB0169"/>
+                          </a:solidFill>
+                          <a:effectLst/>
+                          <a:latin typeface="Consolas" panose="020B0609020204030204" pitchFamily="49" charset="0"/>
+                        </a:rPr>
+                        <a:t>sensor 0</a:t>
+                      </a:r>
+                      <a:br>
+                        <a:rPr lang="en-US" sz="1100" b="1" u="none" strike="noStrike" dirty="0">
+                          <a:effectLst/>
+                          <a:latin typeface="Consolas" panose="020B0609020204030204" pitchFamily="49" charset="0"/>
+                        </a:rPr>
+                      </a:br>
+                      <a:r>
+                        <a:rPr lang="en-US" sz="1100" b="1" u="none" strike="noStrike" dirty="0">
+                          <a:solidFill>
+                            <a:srgbClr val="82A021"/>
+                          </a:solidFill>
+                          <a:effectLst/>
+                          <a:latin typeface="Consolas" panose="020B0609020204030204" pitchFamily="49" charset="0"/>
+                        </a:rPr>
+                        <a:t>group 1</a:t>
+                      </a:r>
+                      <a:br>
+                        <a:rPr lang="en-US" sz="1100" b="1" u="none" strike="noStrike" dirty="0">
+                          <a:effectLst/>
+                          <a:latin typeface="Consolas" panose="020B0609020204030204" pitchFamily="49" charset="0"/>
+                        </a:rPr>
+                      </a:br>
+                      <a:r>
+                        <a:rPr lang="en-US" sz="1100" b="1" u="none" strike="noStrike" dirty="0">
+                          <a:effectLst/>
+                          <a:latin typeface="Consolas" panose="020B0609020204030204" pitchFamily="49" charset="0"/>
+                        </a:rPr>
+                        <a:t>pos last</a:t>
+                      </a:r>
+                      <a:endParaRPr lang="en-US" sz="1100" b="1" i="0" u="none" strike="noStrike" dirty="0">
+                        <a:solidFill>
+                          <a:srgbClr val="000000"/>
+                        </a:solidFill>
+                        <a:effectLst/>
+                        <a:latin typeface="Consolas" panose="020B0609020204030204" pitchFamily="49" charset="0"/>
+                      </a:endParaRPr>
+                    </a:p>
+                  </a:txBody>
+                  <a:tcPr marL="9525" marR="9525" marT="9525" marB="0" anchor="ctr">
+                    <a:lnL w="28575" cap="flat" cmpd="sng" algn="ctr">
+                      <a:solidFill>
+                        <a:schemeClr val="tx1"/>
+                      </a:solidFill>
+                      <a:prstDash val="solid"/>
+                      <a:round/>
+                      <a:headEnd type="none" w="med" len="med"/>
+                      <a:tailEnd type="none" w="med" len="med"/>
+                    </a:lnL>
+                    <a:lnR w="57150" cap="flat" cmpd="sng" algn="ctr">
+                      <a:solidFill>
+                        <a:schemeClr val="tx1"/>
+                      </a:solidFill>
+                      <a:prstDash val="solid"/>
+                      <a:round/>
+                      <a:headEnd type="none" w="med" len="med"/>
+                      <a:tailEnd type="none" w="med" len="med"/>
+                    </a:lnR>
+                    <a:lnT w="28575" cap="flat" cmpd="sng" algn="ctr">
+                      <a:solidFill>
+                        <a:schemeClr val="tx1"/>
+                      </a:solidFill>
+                      <a:prstDash val="solid"/>
+                      <a:round/>
+                      <a:headEnd type="none" w="med" len="med"/>
+                      <a:tailEnd type="none" w="med" len="med"/>
+                    </a:lnT>
+                    <a:lnB w="28575" cap="flat" cmpd="sng" algn="ctr">
+                      <a:solidFill>
+                        <a:schemeClr val="tx1"/>
+                      </a:solidFill>
+                      <a:prstDash val="solid"/>
+                      <a:round/>
+                      <a:headEnd type="none" w="med" len="med"/>
+                      <a:tailEnd type="none" w="med" len="med"/>
+                    </a:lnB>
+                    <a:lnTlToBr w="12700" cmpd="sng">
+                      <a:noFill/>
+                      <a:prstDash val="solid"/>
+                    </a:lnTlToBr>
+                    <a:lnBlToTr w="12700" cmpd="sng">
+                      <a:noFill/>
+                      <a:prstDash val="solid"/>
+                    </a:lnBlToTr>
+                    <a:noFill/>
+                  </a:tcPr>
+                </a:tc>
+                <a:tc>
+                  <a:txBody>
+                    <a:bodyPr/>
+                    <a:lstStyle/>
+                    <a:p>
+                      <a:pPr algn="ctr" fontAlgn="b"/>
+                      <a:r>
+                        <a:rPr lang="en-US" sz="1100" b="1" u="none" strike="noStrike" dirty="0">
+                          <a:solidFill>
+                            <a:srgbClr val="46B5C0"/>
+                          </a:solidFill>
+                          <a:effectLst/>
+                          <a:latin typeface="Consolas" panose="020B0609020204030204" pitchFamily="49" charset="0"/>
+                        </a:rPr>
+                        <a:t>sensor 1</a:t>
+                      </a:r>
+                      <a:br>
+                        <a:rPr lang="en-US" sz="1100" b="1" u="none" strike="noStrike" dirty="0">
+                          <a:effectLst/>
+                          <a:latin typeface="Consolas" panose="020B0609020204030204" pitchFamily="49" charset="0"/>
+                        </a:rPr>
+                      </a:br>
+                      <a:r>
+                        <a:rPr lang="en-US" sz="1100" b="1" u="none" strike="noStrike" dirty="0">
+                          <a:solidFill>
+                            <a:srgbClr val="82A021"/>
+                          </a:solidFill>
+                          <a:effectLst/>
+                          <a:latin typeface="Consolas" panose="020B0609020204030204" pitchFamily="49" charset="0"/>
+                        </a:rPr>
+                        <a:t>group 1</a:t>
+                      </a:r>
+                      <a:br>
+                        <a:rPr lang="en-US" sz="1100" b="1" u="none" strike="noStrike" dirty="0">
+                          <a:effectLst/>
+                          <a:latin typeface="Consolas" panose="020B0609020204030204" pitchFamily="49" charset="0"/>
+                        </a:rPr>
+                      </a:br>
+                      <a:r>
+                        <a:rPr lang="en-US" sz="1100" b="1" u="none" strike="noStrike" dirty="0">
+                          <a:effectLst/>
+                          <a:latin typeface="Consolas" panose="020B0609020204030204" pitchFamily="49" charset="0"/>
+                        </a:rPr>
+                        <a:t>pos 0</a:t>
+                      </a:r>
+                      <a:endParaRPr lang="en-US" sz="1100" b="1" i="0" u="none" strike="noStrike" dirty="0">
+                        <a:solidFill>
+                          <a:srgbClr val="000000"/>
+                        </a:solidFill>
+                        <a:effectLst/>
+                        <a:latin typeface="Consolas" panose="020B0609020204030204" pitchFamily="49" charset="0"/>
+                      </a:endParaRPr>
+                    </a:p>
+                  </a:txBody>
+                  <a:tcPr marL="9525" marR="9525" marT="9525" marB="0" anchor="ctr">
+                    <a:lnL w="57150" cap="flat" cmpd="sng" algn="ctr">
+                      <a:solidFill>
+                        <a:schemeClr val="tx1"/>
+                      </a:solidFill>
+                      <a:prstDash val="solid"/>
+                      <a:round/>
+                      <a:headEnd type="none" w="med" len="med"/>
+                      <a:tailEnd type="none" w="med" len="med"/>
+                    </a:lnL>
+                    <a:lnR w="28575" cap="flat" cmpd="sng" algn="ctr">
+                      <a:solidFill>
+                        <a:schemeClr val="tx1"/>
+                      </a:solidFill>
+                      <a:prstDash val="solid"/>
+                      <a:round/>
+                      <a:headEnd type="none" w="med" len="med"/>
+                      <a:tailEnd type="none" w="med" len="med"/>
+                    </a:lnR>
+                    <a:lnT w="28575" cap="flat" cmpd="sng" algn="ctr">
+                      <a:solidFill>
+                        <a:schemeClr val="tx1"/>
+                      </a:solidFill>
+                      <a:prstDash val="solid"/>
+                      <a:round/>
+                      <a:headEnd type="none" w="med" len="med"/>
+                      <a:tailEnd type="none" w="med" len="med"/>
+                    </a:lnT>
+                    <a:lnB w="28575" cap="flat" cmpd="sng" algn="ctr">
+                      <a:solidFill>
+                        <a:schemeClr val="tx1"/>
+                      </a:solidFill>
+                      <a:prstDash val="solid"/>
+                      <a:round/>
+                      <a:headEnd type="none" w="med" len="med"/>
+                      <a:tailEnd type="none" w="med" len="med"/>
+                    </a:lnB>
+                    <a:lnTlToBr w="12700" cmpd="sng">
+                      <a:noFill/>
+                      <a:prstDash val="solid"/>
+                    </a:lnTlToBr>
+                    <a:lnBlToTr w="12700" cmpd="sng">
+                      <a:noFill/>
+                      <a:prstDash val="solid"/>
+                    </a:lnBlToTr>
+                    <a:noFill/>
+                  </a:tcPr>
+                </a:tc>
+                <a:tc>
+                  <a:txBody>
+                    <a:bodyPr/>
+                    <a:lstStyle/>
+                    <a:p>
+                      <a:pPr algn="ctr" fontAlgn="b"/>
+                      <a:r>
+                        <a:rPr lang="en-US" sz="1100" b="1" u="none" strike="noStrike" dirty="0">
+                          <a:solidFill>
+                            <a:srgbClr val="46B5C0"/>
+                          </a:solidFill>
+                          <a:effectLst/>
+                          <a:latin typeface="Consolas" panose="020B0609020204030204" pitchFamily="49" charset="0"/>
+                        </a:rPr>
+                        <a:t>sensor 1</a:t>
+                      </a:r>
+                      <a:br>
+                        <a:rPr lang="en-US" sz="1100" b="1" u="none" strike="noStrike" dirty="0">
+                          <a:effectLst/>
+                          <a:latin typeface="Consolas" panose="020B0609020204030204" pitchFamily="49" charset="0"/>
+                        </a:rPr>
+                      </a:br>
+                      <a:r>
+                        <a:rPr lang="en-US" sz="1100" b="1" u="none" strike="noStrike" dirty="0">
+                          <a:solidFill>
+                            <a:srgbClr val="82A021"/>
+                          </a:solidFill>
+                          <a:effectLst/>
+                          <a:latin typeface="Consolas" panose="020B0609020204030204" pitchFamily="49" charset="0"/>
+                        </a:rPr>
+                        <a:t>group 1</a:t>
+                      </a:r>
+                      <a:br>
+                        <a:rPr lang="en-US" sz="1100" b="1" u="none" strike="noStrike" dirty="0">
+                          <a:effectLst/>
+                          <a:latin typeface="Consolas" panose="020B0609020204030204" pitchFamily="49" charset="0"/>
+                        </a:rPr>
+                      </a:br>
+                      <a:r>
+                        <a:rPr lang="en-US" sz="1100" b="1" u="none" strike="noStrike" dirty="0">
+                          <a:effectLst/>
+                          <a:latin typeface="Consolas" panose="020B0609020204030204" pitchFamily="49" charset="0"/>
+                        </a:rPr>
+                        <a:t>pos 1</a:t>
+                      </a:r>
+                      <a:endParaRPr lang="en-US" sz="1100" b="1" i="0" u="none" strike="noStrike" dirty="0">
+                        <a:solidFill>
+                          <a:srgbClr val="000000"/>
+                        </a:solidFill>
+                        <a:effectLst/>
+                        <a:latin typeface="Consolas" panose="020B0609020204030204" pitchFamily="49" charset="0"/>
+                      </a:endParaRPr>
+                    </a:p>
+                  </a:txBody>
+                  <a:tcPr marL="9525" marR="9525" marT="9525" marB="0" anchor="ctr">
+                    <a:lnL w="28575" cap="flat" cmpd="sng" algn="ctr">
+                      <a:solidFill>
+                        <a:schemeClr val="tx1"/>
+                      </a:solidFill>
+                      <a:prstDash val="solid"/>
+                      <a:round/>
+                      <a:headEnd type="none" w="med" len="med"/>
+                      <a:tailEnd type="none" w="med" len="med"/>
+                    </a:lnL>
+                    <a:lnR w="28575" cap="flat" cmpd="sng" algn="ctr">
+                      <a:solidFill>
+                        <a:schemeClr val="tx1"/>
+                      </a:solidFill>
+                      <a:prstDash val="solid"/>
+                      <a:round/>
+                      <a:headEnd type="none" w="med" len="med"/>
+                      <a:tailEnd type="none" w="med" len="med"/>
+                    </a:lnR>
+                    <a:lnT w="28575" cap="flat" cmpd="sng" algn="ctr">
+                      <a:solidFill>
+                        <a:schemeClr val="tx1"/>
+                      </a:solidFill>
+                      <a:prstDash val="solid"/>
+                      <a:round/>
+                      <a:headEnd type="none" w="med" len="med"/>
+                      <a:tailEnd type="none" w="med" len="med"/>
+                    </a:lnT>
+                    <a:lnB w="28575" cap="flat" cmpd="sng" algn="ctr">
+                      <a:solidFill>
+                        <a:schemeClr val="tx1"/>
+                      </a:solidFill>
+                      <a:prstDash val="solid"/>
+                      <a:round/>
+                      <a:headEnd type="none" w="med" len="med"/>
+                      <a:tailEnd type="none" w="med" len="med"/>
+                    </a:lnB>
+                    <a:lnTlToBr w="12700" cmpd="sng">
+                      <a:noFill/>
+                      <a:prstDash val="solid"/>
+                    </a:lnTlToBr>
+                    <a:lnBlToTr w="12700" cmpd="sng">
+                      <a:noFill/>
+                      <a:prstDash val="solid"/>
+                    </a:lnBlToTr>
+                    <a:noFill/>
+                  </a:tcPr>
+                </a:tc>
+                <a:tc>
+                  <a:txBody>
+                    <a:bodyPr/>
+                    <a:lstStyle/>
+                    <a:p>
+                      <a:pPr algn="ctr" fontAlgn="b"/>
+                      <a:r>
+                        <a:rPr lang="it-IT" sz="1100" b="1" u="none" strike="noStrike" dirty="0">
+                          <a:effectLst/>
+                          <a:latin typeface="Consolas" panose="020B0609020204030204" pitchFamily="49" charset="0"/>
+                        </a:rPr>
+                        <a:t>...</a:t>
+                      </a:r>
+                      <a:endParaRPr lang="it-IT" sz="1100" b="1" i="0" u="none" strike="noStrike" dirty="0">
+                        <a:solidFill>
+                          <a:srgbClr val="000000"/>
+                        </a:solidFill>
+                        <a:effectLst/>
+                        <a:latin typeface="Consolas" panose="020B0609020204030204" pitchFamily="49" charset="0"/>
+                      </a:endParaRPr>
+                    </a:p>
+                  </a:txBody>
+                  <a:tcPr marL="9525" marR="9525" marT="9525" marB="0" anchor="ctr">
+                    <a:lnL w="28575" cap="flat" cmpd="sng" algn="ctr">
+                      <a:solidFill>
+                        <a:schemeClr val="tx1"/>
+                      </a:solidFill>
+                      <a:prstDash val="solid"/>
+                      <a:round/>
+                      <a:headEnd type="none" w="med" len="med"/>
+                      <a:tailEnd type="none" w="med" len="med"/>
+                    </a:lnL>
+                    <a:lnR w="28575" cap="flat" cmpd="sng" algn="ctr">
+                      <a:solidFill>
+                        <a:schemeClr val="tx1"/>
+                      </a:solidFill>
+                      <a:prstDash val="solid"/>
+                      <a:round/>
+                      <a:headEnd type="none" w="med" len="med"/>
+                      <a:tailEnd type="none" w="med" len="med"/>
+                    </a:lnR>
+                    <a:lnT w="28575" cap="flat" cmpd="sng" algn="ctr">
+                      <a:solidFill>
+                        <a:schemeClr val="tx1"/>
+                      </a:solidFill>
+                      <a:prstDash val="solid"/>
+                      <a:round/>
+                      <a:headEnd type="none" w="med" len="med"/>
+                      <a:tailEnd type="none" w="med" len="med"/>
+                    </a:lnT>
+                    <a:lnB w="28575" cap="flat" cmpd="sng" algn="ctr">
+                      <a:solidFill>
+                        <a:schemeClr val="tx1"/>
+                      </a:solidFill>
+                      <a:prstDash val="solid"/>
+                      <a:round/>
+                      <a:headEnd type="none" w="med" len="med"/>
+                      <a:tailEnd type="none" w="med" len="med"/>
+                    </a:lnB>
+                    <a:lnTlToBr w="12700" cmpd="sng">
+                      <a:noFill/>
+                      <a:prstDash val="solid"/>
+                    </a:lnTlToBr>
+                    <a:lnBlToTr w="12700" cmpd="sng">
+                      <a:noFill/>
+                      <a:prstDash val="solid"/>
+                    </a:lnBlToTr>
+                    <a:noFill/>
+                  </a:tcPr>
+                </a:tc>
+                <a:tc>
+                  <a:txBody>
+                    <a:bodyPr/>
+                    <a:lstStyle/>
+                    <a:p>
+                      <a:pPr algn="ctr" fontAlgn="b"/>
+                      <a:r>
+                        <a:rPr lang="en-US" sz="1100" b="1" u="none" strike="noStrike" dirty="0">
+                          <a:solidFill>
+                            <a:srgbClr val="46B5C0"/>
+                          </a:solidFill>
+                          <a:effectLst/>
+                          <a:latin typeface="Consolas" panose="020B0609020204030204" pitchFamily="49" charset="0"/>
+                        </a:rPr>
+                        <a:t>sensor 1</a:t>
+                      </a:r>
+                      <a:br>
+                        <a:rPr lang="en-US" sz="1100" b="1" u="none" strike="noStrike" dirty="0">
+                          <a:effectLst/>
+                          <a:latin typeface="Consolas" panose="020B0609020204030204" pitchFamily="49" charset="0"/>
+                        </a:rPr>
+                      </a:br>
+                      <a:r>
+                        <a:rPr lang="en-US" sz="1100" b="1" u="none" strike="noStrike" dirty="0">
+                          <a:solidFill>
+                            <a:srgbClr val="82A021"/>
+                          </a:solidFill>
+                          <a:effectLst/>
+                          <a:latin typeface="Consolas" panose="020B0609020204030204" pitchFamily="49" charset="0"/>
+                        </a:rPr>
+                        <a:t>group 1</a:t>
+                      </a:r>
+                      <a:br>
+                        <a:rPr lang="en-US" sz="1100" b="1" u="none" strike="noStrike" dirty="0">
+                          <a:effectLst/>
+                          <a:latin typeface="Consolas" panose="020B0609020204030204" pitchFamily="49" charset="0"/>
+                        </a:rPr>
+                      </a:br>
+                      <a:r>
+                        <a:rPr lang="en-US" sz="1100" b="1" u="none" strike="noStrike" dirty="0">
+                          <a:effectLst/>
+                          <a:latin typeface="Consolas" panose="020B0609020204030204" pitchFamily="49" charset="0"/>
+                        </a:rPr>
+                        <a:t>pos last</a:t>
+                      </a:r>
+                      <a:endParaRPr lang="en-US" sz="1100" b="1" i="0" u="none" strike="noStrike" dirty="0">
+                        <a:solidFill>
+                          <a:srgbClr val="000000"/>
+                        </a:solidFill>
+                        <a:effectLst/>
+                        <a:latin typeface="Consolas" panose="020B0609020204030204" pitchFamily="49" charset="0"/>
+                      </a:endParaRPr>
+                    </a:p>
+                  </a:txBody>
+                  <a:tcPr marL="9525" marR="9525" marT="9525" marB="0" anchor="ctr">
+                    <a:lnL w="28575" cap="flat" cmpd="sng" algn="ctr">
+                      <a:solidFill>
+                        <a:schemeClr val="tx1"/>
+                      </a:solidFill>
+                      <a:prstDash val="solid"/>
+                      <a:round/>
+                      <a:headEnd type="none" w="med" len="med"/>
+                      <a:tailEnd type="none" w="med" len="med"/>
+                    </a:lnL>
+                    <a:lnR w="28575" cap="flat" cmpd="sng" algn="ctr">
+                      <a:solidFill>
+                        <a:schemeClr val="tx1"/>
+                      </a:solidFill>
+                      <a:prstDash val="solid"/>
+                      <a:round/>
+                      <a:headEnd type="none" w="med" len="med"/>
+                      <a:tailEnd type="none" w="med" len="med"/>
+                    </a:lnR>
+                    <a:lnT w="28575" cap="flat" cmpd="sng" algn="ctr">
+                      <a:solidFill>
+                        <a:schemeClr val="tx1"/>
+                      </a:solidFill>
+                      <a:prstDash val="solid"/>
+                      <a:round/>
+                      <a:headEnd type="none" w="med" len="med"/>
+                      <a:tailEnd type="none" w="med" len="med"/>
+                    </a:lnT>
+                    <a:lnB w="28575" cap="flat" cmpd="sng" algn="ctr">
+                      <a:solidFill>
+                        <a:schemeClr val="tx1"/>
+                      </a:solidFill>
+                      <a:prstDash val="solid"/>
+                      <a:round/>
+                      <a:headEnd type="none" w="med" len="med"/>
+                      <a:tailEnd type="none" w="med" len="med"/>
+                    </a:lnB>
+                    <a:lnTlToBr w="12700" cmpd="sng">
+                      <a:noFill/>
+                      <a:prstDash val="solid"/>
+                    </a:lnTlToBr>
+                    <a:lnBlToTr w="12700" cmpd="sng">
+                      <a:noFill/>
+                      <a:prstDash val="solid"/>
+                    </a:lnBlToTr>
+                    <a:noFill/>
+                  </a:tcPr>
+                </a:tc>
+                <a:tc>
+                  <a:txBody>
+                    <a:bodyPr/>
+                    <a:lstStyle/>
+                    <a:p>
+                      <a:pPr algn="ctr" fontAlgn="b"/>
+                      <a:r>
+                        <a:rPr kumimoji="0" lang="it-IT" sz="1100" b="1" i="0" u="none" strike="noStrike" kern="1200" cap="none" spc="0" normalizeH="0" baseline="0" noProof="0">
+                          <a:ln>
+                            <a:noFill/>
+                          </a:ln>
+                          <a:solidFill>
+                            <a:prstClr val="black"/>
+                          </a:solidFill>
+                          <a:effectLst/>
+                          <a:uLnTx/>
+                          <a:uFillTx/>
+                          <a:latin typeface="Consolas" panose="020B0609020204030204" pitchFamily="49" charset="0"/>
+                          <a:ea typeface="+mn-ea"/>
+                          <a:cs typeface="+mn-cs"/>
+                        </a:rPr>
+                        <a:t>...</a:t>
+                      </a:r>
+                      <a:endParaRPr lang="it-IT" sz="1100" b="1" i="0" u="none" strike="noStrike" dirty="0">
+                        <a:solidFill>
+                          <a:srgbClr val="000000"/>
+                        </a:solidFill>
+                        <a:effectLst/>
+                        <a:latin typeface="Consolas" panose="020B0609020204030204" pitchFamily="49" charset="0"/>
+                      </a:endParaRPr>
+                    </a:p>
+                  </a:txBody>
+                  <a:tcPr marL="9525" marR="9525" marT="9525" marB="0" anchor="ctr">
+                    <a:lnL w="28575" cap="flat" cmpd="sng" algn="ctr">
+                      <a:solidFill>
+                        <a:schemeClr val="tx1"/>
+                      </a:solidFill>
+                      <a:prstDash val="solid"/>
+                      <a:round/>
+                      <a:headEnd type="none" w="med" len="med"/>
+                      <a:tailEnd type="none" w="med" len="med"/>
+                    </a:lnL>
+                    <a:lnR w="28575" cap="flat" cmpd="sng" algn="ctr">
+                      <a:solidFill>
+                        <a:schemeClr val="tx1"/>
+                      </a:solidFill>
+                      <a:prstDash val="solid"/>
+                      <a:round/>
+                      <a:headEnd type="none" w="med" len="med"/>
+                      <a:tailEnd type="none" w="med" len="med"/>
+                    </a:lnR>
+                    <a:lnT w="28575" cap="flat" cmpd="sng" algn="ctr">
+                      <a:solidFill>
+                        <a:schemeClr val="tx1"/>
+                      </a:solidFill>
+                      <a:prstDash val="solid"/>
+                      <a:round/>
+                      <a:headEnd type="none" w="med" len="med"/>
+                      <a:tailEnd type="none" w="med" len="med"/>
+                    </a:lnT>
+                    <a:lnB w="28575" cap="flat" cmpd="sng" algn="ctr">
+                      <a:solidFill>
+                        <a:schemeClr val="tx1"/>
+                      </a:solidFill>
+                      <a:prstDash val="solid"/>
+                      <a:round/>
+                      <a:headEnd type="none" w="med" len="med"/>
+                      <a:tailEnd type="none" w="med" len="med"/>
+                    </a:lnB>
+                    <a:lnTlToBr w="12700" cmpd="sng">
+                      <a:noFill/>
+                      <a:prstDash val="solid"/>
+                    </a:lnTlToBr>
+                    <a:lnBlToTr w="12700" cmpd="sng">
+                      <a:noFill/>
+                      <a:prstDash val="solid"/>
+                    </a:lnBlToTr>
+                    <a:noFill/>
+                  </a:tcPr>
+                </a:tc>
+                <a:extLst>
+                  <a:ext uri="{0D108BD9-81ED-4DB2-BD59-A6C34878D82A}">
+                    <a16:rowId xmlns:a16="http://schemas.microsoft.com/office/drawing/2014/main" val="1244472773"/>
+                  </a:ext>
+                </a:extLst>
+              </a:tr>
+              <a:tr h="684000">
+                <a:tc>
+                  <a:txBody>
+                    <a:bodyPr/>
+                    <a:lstStyle/>
+                    <a:p>
+                      <a:pPr algn="ctr" fontAlgn="b"/>
+                      <a:r>
+                        <a:rPr lang="en-US" sz="1100" b="1" u="none" strike="noStrike" dirty="0">
+                          <a:solidFill>
+                            <a:srgbClr val="FB0169"/>
+                          </a:solidFill>
+                          <a:effectLst/>
+                          <a:latin typeface="Consolas" panose="020B0609020204030204" pitchFamily="49" charset="0"/>
+                        </a:rPr>
+                        <a:t>sensor 0</a:t>
+                      </a:r>
+                      <a:br>
+                        <a:rPr lang="en-US" sz="1100" b="1" u="none" strike="noStrike" dirty="0">
+                          <a:effectLst/>
+                          <a:latin typeface="Consolas" panose="020B0609020204030204" pitchFamily="49" charset="0"/>
+                        </a:rPr>
+                      </a:br>
+                      <a:r>
+                        <a:rPr lang="en-US" sz="1100" b="1" u="none" strike="noStrike" dirty="0">
+                          <a:solidFill>
+                            <a:srgbClr val="7030A0"/>
+                          </a:solidFill>
+                          <a:effectLst/>
+                          <a:latin typeface="Consolas" panose="020B0609020204030204" pitchFamily="49" charset="0"/>
+                        </a:rPr>
+                        <a:t>group 2</a:t>
+                      </a:r>
+                      <a:br>
+                        <a:rPr lang="en-US" sz="1100" b="1" u="none" strike="noStrike" dirty="0">
+                          <a:effectLst/>
+                          <a:latin typeface="Consolas" panose="020B0609020204030204" pitchFamily="49" charset="0"/>
+                        </a:rPr>
+                      </a:br>
+                      <a:r>
+                        <a:rPr lang="en-US" sz="1100" b="1" u="none" strike="noStrike" dirty="0">
+                          <a:effectLst/>
+                          <a:latin typeface="Consolas" panose="020B0609020204030204" pitchFamily="49" charset="0"/>
+                        </a:rPr>
+                        <a:t>pos 0</a:t>
+                      </a:r>
+                      <a:endParaRPr lang="en-US" sz="1100" b="1" i="0" u="none" strike="noStrike" dirty="0">
+                        <a:solidFill>
+                          <a:srgbClr val="000000"/>
+                        </a:solidFill>
+                        <a:effectLst/>
+                        <a:latin typeface="Consolas" panose="020B0609020204030204" pitchFamily="49" charset="0"/>
+                      </a:endParaRPr>
+                    </a:p>
+                  </a:txBody>
+                  <a:tcPr marL="9525" marR="9525" marT="9525" marB="0" anchor="ctr">
+                    <a:lnL w="28575" cap="flat" cmpd="sng" algn="ctr">
+                      <a:solidFill>
+                        <a:schemeClr val="tx1"/>
+                      </a:solidFill>
+                      <a:prstDash val="solid"/>
+                      <a:round/>
+                      <a:headEnd type="none" w="med" len="med"/>
+                      <a:tailEnd type="none" w="med" len="med"/>
+                    </a:lnL>
+                    <a:lnR w="28575" cap="flat" cmpd="sng" algn="ctr">
+                      <a:solidFill>
+                        <a:schemeClr val="tx1"/>
+                      </a:solidFill>
+                      <a:prstDash val="solid"/>
+                      <a:round/>
+                      <a:headEnd type="none" w="med" len="med"/>
+                      <a:tailEnd type="none" w="med" len="med"/>
+                    </a:lnR>
+                    <a:lnT w="28575" cap="flat" cmpd="sng" algn="ctr">
+                      <a:solidFill>
+                        <a:schemeClr val="tx1"/>
+                      </a:solidFill>
+                      <a:prstDash val="solid"/>
+                      <a:round/>
+                      <a:headEnd type="none" w="med" len="med"/>
+                      <a:tailEnd type="none" w="med" len="med"/>
+                    </a:lnT>
+                    <a:lnB w="28575" cap="flat" cmpd="sng" algn="ctr">
+                      <a:solidFill>
+                        <a:schemeClr val="tx1"/>
+                      </a:solidFill>
+                      <a:prstDash val="solid"/>
+                      <a:round/>
+                      <a:headEnd type="none" w="med" len="med"/>
+                      <a:tailEnd type="none" w="med" len="med"/>
+                    </a:lnB>
+                    <a:lnTlToBr w="12700" cmpd="sng">
+                      <a:noFill/>
+                      <a:prstDash val="solid"/>
+                    </a:lnTlToBr>
+                    <a:lnBlToTr w="12700" cmpd="sng">
+                      <a:noFill/>
+                      <a:prstDash val="solid"/>
+                    </a:lnBlToTr>
+                    <a:noFill/>
+                  </a:tcPr>
+                </a:tc>
+                <a:tc>
+                  <a:txBody>
+                    <a:bodyPr/>
+                    <a:lstStyle/>
+                    <a:p>
+                      <a:pPr algn="ctr" fontAlgn="b"/>
+                      <a:r>
+                        <a:rPr lang="en-US" sz="1100" b="1" u="none" strike="noStrike" dirty="0">
+                          <a:solidFill>
+                            <a:srgbClr val="FB0169"/>
+                          </a:solidFill>
+                          <a:effectLst/>
+                          <a:latin typeface="Consolas" panose="020B0609020204030204" pitchFamily="49" charset="0"/>
+                        </a:rPr>
+                        <a:t>sensor 0</a:t>
+                      </a:r>
+                      <a:br>
+                        <a:rPr lang="en-US" sz="1100" b="1" u="none" strike="noStrike" dirty="0">
+                          <a:effectLst/>
+                          <a:latin typeface="Consolas" panose="020B0609020204030204" pitchFamily="49" charset="0"/>
+                        </a:rPr>
+                      </a:br>
+                      <a:r>
+                        <a:rPr lang="en-US" sz="1100" b="1" u="none" strike="noStrike" dirty="0">
+                          <a:solidFill>
+                            <a:srgbClr val="7030A0"/>
+                          </a:solidFill>
+                          <a:effectLst/>
+                          <a:latin typeface="Consolas" panose="020B0609020204030204" pitchFamily="49" charset="0"/>
+                        </a:rPr>
+                        <a:t>group 2</a:t>
+                      </a:r>
+                      <a:br>
+                        <a:rPr lang="en-US" sz="1100" b="1" u="none" strike="noStrike" dirty="0">
+                          <a:effectLst/>
+                          <a:latin typeface="Consolas" panose="020B0609020204030204" pitchFamily="49" charset="0"/>
+                        </a:rPr>
+                      </a:br>
+                      <a:r>
+                        <a:rPr lang="en-US" sz="1100" b="1" u="none" strike="noStrike" dirty="0">
+                          <a:effectLst/>
+                          <a:latin typeface="Consolas" panose="020B0609020204030204" pitchFamily="49" charset="0"/>
+                        </a:rPr>
+                        <a:t>pos 1</a:t>
+                      </a:r>
+                      <a:endParaRPr lang="en-US" sz="1100" b="1" i="0" u="none" strike="noStrike" dirty="0">
+                        <a:solidFill>
+                          <a:srgbClr val="000000"/>
+                        </a:solidFill>
+                        <a:effectLst/>
+                        <a:latin typeface="Consolas" panose="020B0609020204030204" pitchFamily="49" charset="0"/>
+                      </a:endParaRPr>
+                    </a:p>
+                  </a:txBody>
+                  <a:tcPr marL="9525" marR="9525" marT="9525" marB="0" anchor="ctr">
+                    <a:lnL w="28575" cap="flat" cmpd="sng" algn="ctr">
+                      <a:solidFill>
+                        <a:schemeClr val="tx1"/>
+                      </a:solidFill>
+                      <a:prstDash val="solid"/>
+                      <a:round/>
+                      <a:headEnd type="none" w="med" len="med"/>
+                      <a:tailEnd type="none" w="med" len="med"/>
+                    </a:lnL>
+                    <a:lnR w="28575" cap="flat" cmpd="sng" algn="ctr">
+                      <a:solidFill>
+                        <a:schemeClr val="tx1"/>
+                      </a:solidFill>
+                      <a:prstDash val="solid"/>
+                      <a:round/>
+                      <a:headEnd type="none" w="med" len="med"/>
+                      <a:tailEnd type="none" w="med" len="med"/>
+                    </a:lnR>
+                    <a:lnT w="28575" cap="flat" cmpd="sng" algn="ctr">
+                      <a:solidFill>
+                        <a:schemeClr val="tx1"/>
+                      </a:solidFill>
+                      <a:prstDash val="solid"/>
+                      <a:round/>
+                      <a:headEnd type="none" w="med" len="med"/>
+                      <a:tailEnd type="none" w="med" len="med"/>
+                    </a:lnT>
+                    <a:lnB w="28575" cap="flat" cmpd="sng" algn="ctr">
+                      <a:solidFill>
+                        <a:schemeClr val="tx1"/>
+                      </a:solidFill>
+                      <a:prstDash val="solid"/>
+                      <a:round/>
+                      <a:headEnd type="none" w="med" len="med"/>
+                      <a:tailEnd type="none" w="med" len="med"/>
+                    </a:lnB>
+                    <a:lnTlToBr w="12700" cmpd="sng">
+                      <a:noFill/>
+                      <a:prstDash val="solid"/>
+                    </a:lnTlToBr>
+                    <a:lnBlToTr w="12700" cmpd="sng">
+                      <a:noFill/>
+                      <a:prstDash val="solid"/>
+                    </a:lnBlToTr>
+                    <a:noFill/>
+                  </a:tcPr>
+                </a:tc>
+                <a:tc>
+                  <a:txBody>
+                    <a:bodyPr/>
+                    <a:lstStyle/>
+                    <a:p>
+                      <a:pPr algn="ctr" fontAlgn="b"/>
+                      <a:r>
+                        <a:rPr kumimoji="0" lang="it-IT" sz="1100" b="1" i="0" u="none" strike="noStrike" kern="1200" cap="none" spc="0" normalizeH="0" baseline="0" noProof="0">
+                          <a:ln>
+                            <a:noFill/>
+                          </a:ln>
+                          <a:solidFill>
+                            <a:prstClr val="black"/>
+                          </a:solidFill>
+                          <a:effectLst/>
+                          <a:uLnTx/>
+                          <a:uFillTx/>
+                          <a:latin typeface="Consolas" panose="020B0609020204030204" pitchFamily="49" charset="0"/>
+                          <a:ea typeface="+mn-ea"/>
+                          <a:cs typeface="+mn-cs"/>
+                        </a:rPr>
+                        <a:t>...</a:t>
+                      </a:r>
+                      <a:endParaRPr lang="it-IT" sz="1100" b="1" i="0" u="none" strike="noStrike" dirty="0">
+                        <a:solidFill>
+                          <a:srgbClr val="000000"/>
+                        </a:solidFill>
+                        <a:effectLst/>
+                        <a:latin typeface="Consolas" panose="020B0609020204030204" pitchFamily="49" charset="0"/>
+                      </a:endParaRPr>
+                    </a:p>
+                  </a:txBody>
+                  <a:tcPr marL="9525" marR="9525" marT="9525" marB="0" anchor="ctr">
+                    <a:lnL w="28575" cap="flat" cmpd="sng" algn="ctr">
+                      <a:solidFill>
+                        <a:schemeClr val="tx1"/>
+                      </a:solidFill>
+                      <a:prstDash val="solid"/>
+                      <a:round/>
+                      <a:headEnd type="none" w="med" len="med"/>
+                      <a:tailEnd type="none" w="med" len="med"/>
+                    </a:lnL>
+                    <a:lnR w="28575" cap="flat" cmpd="sng" algn="ctr">
+                      <a:solidFill>
+                        <a:schemeClr val="tx1"/>
+                      </a:solidFill>
+                      <a:prstDash val="solid"/>
+                      <a:round/>
+                      <a:headEnd type="none" w="med" len="med"/>
+                      <a:tailEnd type="none" w="med" len="med"/>
+                    </a:lnR>
+                    <a:lnT w="28575" cap="flat" cmpd="sng" algn="ctr">
+                      <a:solidFill>
+                        <a:schemeClr val="tx1"/>
+                      </a:solidFill>
+                      <a:prstDash val="solid"/>
+                      <a:round/>
+                      <a:headEnd type="none" w="med" len="med"/>
+                      <a:tailEnd type="none" w="med" len="med"/>
+                    </a:lnT>
+                    <a:lnB w="28575" cap="flat" cmpd="sng" algn="ctr">
+                      <a:solidFill>
+                        <a:schemeClr val="tx1"/>
+                      </a:solidFill>
+                      <a:prstDash val="solid"/>
+                      <a:round/>
+                      <a:headEnd type="none" w="med" len="med"/>
+                      <a:tailEnd type="none" w="med" len="med"/>
+                    </a:lnB>
+                    <a:lnTlToBr w="12700" cmpd="sng">
+                      <a:noFill/>
+                      <a:prstDash val="solid"/>
+                    </a:lnTlToBr>
+                    <a:lnBlToTr w="12700" cmpd="sng">
+                      <a:noFill/>
+                      <a:prstDash val="solid"/>
+                    </a:lnBlToTr>
+                    <a:noFill/>
+                  </a:tcPr>
+                </a:tc>
+                <a:tc>
+                  <a:txBody>
+                    <a:bodyPr/>
+                    <a:lstStyle/>
+                    <a:p>
+                      <a:pPr algn="ctr" fontAlgn="b"/>
+                      <a:r>
+                        <a:rPr lang="en-US" sz="1100" b="1" u="none" strike="noStrike" dirty="0">
+                          <a:solidFill>
+                            <a:srgbClr val="FB0169"/>
+                          </a:solidFill>
+                          <a:effectLst/>
+                          <a:latin typeface="Consolas" panose="020B0609020204030204" pitchFamily="49" charset="0"/>
+                        </a:rPr>
+                        <a:t>sensor 0</a:t>
+                      </a:r>
+                      <a:br>
+                        <a:rPr lang="en-US" sz="1100" b="1" u="none" strike="noStrike" dirty="0">
+                          <a:effectLst/>
+                          <a:latin typeface="Consolas" panose="020B0609020204030204" pitchFamily="49" charset="0"/>
+                        </a:rPr>
+                      </a:br>
+                      <a:r>
+                        <a:rPr lang="en-US" sz="1100" b="1" u="none" strike="noStrike" dirty="0">
+                          <a:solidFill>
+                            <a:srgbClr val="7030A0"/>
+                          </a:solidFill>
+                          <a:effectLst/>
+                          <a:latin typeface="Consolas" panose="020B0609020204030204" pitchFamily="49" charset="0"/>
+                        </a:rPr>
+                        <a:t>group 2</a:t>
+                      </a:r>
+                      <a:br>
+                        <a:rPr lang="en-US" sz="1100" b="1" u="none" strike="noStrike" dirty="0">
+                          <a:effectLst/>
+                          <a:latin typeface="Consolas" panose="020B0609020204030204" pitchFamily="49" charset="0"/>
+                        </a:rPr>
+                      </a:br>
+                      <a:r>
+                        <a:rPr lang="en-US" sz="1100" b="1" u="none" strike="noStrike" dirty="0">
+                          <a:effectLst/>
+                          <a:latin typeface="Consolas" panose="020B0609020204030204" pitchFamily="49" charset="0"/>
+                        </a:rPr>
+                        <a:t>pos last</a:t>
+                      </a:r>
+                      <a:endParaRPr lang="en-US" sz="1100" b="1" i="0" u="none" strike="noStrike" dirty="0">
+                        <a:solidFill>
+                          <a:srgbClr val="000000"/>
+                        </a:solidFill>
+                        <a:effectLst/>
+                        <a:latin typeface="Consolas" panose="020B0609020204030204" pitchFamily="49" charset="0"/>
+                      </a:endParaRPr>
+                    </a:p>
+                  </a:txBody>
+                  <a:tcPr marL="9525" marR="9525" marT="9525" marB="0" anchor="ctr">
+                    <a:lnL w="28575" cap="flat" cmpd="sng" algn="ctr">
+                      <a:solidFill>
+                        <a:schemeClr val="tx1"/>
+                      </a:solidFill>
+                      <a:prstDash val="solid"/>
+                      <a:round/>
+                      <a:headEnd type="none" w="med" len="med"/>
+                      <a:tailEnd type="none" w="med" len="med"/>
+                    </a:lnL>
+                    <a:lnR w="57150" cap="flat" cmpd="sng" algn="ctr">
+                      <a:solidFill>
+                        <a:schemeClr val="tx1"/>
+                      </a:solidFill>
+                      <a:prstDash val="solid"/>
+                      <a:round/>
+                      <a:headEnd type="none" w="med" len="med"/>
+                      <a:tailEnd type="none" w="med" len="med"/>
+                    </a:lnR>
+                    <a:lnT w="28575" cap="flat" cmpd="sng" algn="ctr">
+                      <a:solidFill>
+                        <a:schemeClr val="tx1"/>
+                      </a:solidFill>
+                      <a:prstDash val="solid"/>
+                      <a:round/>
+                      <a:headEnd type="none" w="med" len="med"/>
+                      <a:tailEnd type="none" w="med" len="med"/>
+                    </a:lnT>
+                    <a:lnB w="28575" cap="flat" cmpd="sng" algn="ctr">
+                      <a:solidFill>
+                        <a:schemeClr val="tx1"/>
+                      </a:solidFill>
+                      <a:prstDash val="solid"/>
+                      <a:round/>
+                      <a:headEnd type="none" w="med" len="med"/>
+                      <a:tailEnd type="none" w="med" len="med"/>
+                    </a:lnB>
+                    <a:lnTlToBr w="12700" cmpd="sng">
+                      <a:noFill/>
+                      <a:prstDash val="solid"/>
+                    </a:lnTlToBr>
+                    <a:lnBlToTr w="12700" cmpd="sng">
+                      <a:noFill/>
+                      <a:prstDash val="solid"/>
+                    </a:lnBlToTr>
+                    <a:noFill/>
+                  </a:tcPr>
+                </a:tc>
+                <a:tc>
+                  <a:txBody>
+                    <a:bodyPr/>
+                    <a:lstStyle/>
+                    <a:p>
+                      <a:pPr algn="ctr" fontAlgn="b"/>
+                      <a:r>
+                        <a:rPr lang="en-US" sz="1100" b="1" u="none" strike="noStrike" dirty="0">
+                          <a:solidFill>
+                            <a:srgbClr val="46B5C0"/>
+                          </a:solidFill>
+                          <a:effectLst/>
+                          <a:latin typeface="Consolas" panose="020B0609020204030204" pitchFamily="49" charset="0"/>
+                        </a:rPr>
+                        <a:t>sensor 1</a:t>
+                      </a:r>
+                      <a:br>
+                        <a:rPr lang="en-US" sz="1100" b="1" u="none" strike="noStrike" dirty="0">
+                          <a:solidFill>
+                            <a:srgbClr val="46B5C0"/>
+                          </a:solidFill>
+                          <a:effectLst/>
+                          <a:latin typeface="Consolas" panose="020B0609020204030204" pitchFamily="49" charset="0"/>
+                        </a:rPr>
+                      </a:br>
+                      <a:r>
+                        <a:rPr lang="en-US" sz="1100" b="1" u="none" strike="noStrike" dirty="0">
+                          <a:solidFill>
+                            <a:srgbClr val="7030A0"/>
+                          </a:solidFill>
+                          <a:effectLst/>
+                          <a:latin typeface="Consolas" panose="020B0609020204030204" pitchFamily="49" charset="0"/>
+                        </a:rPr>
+                        <a:t>group 2</a:t>
+                      </a:r>
+                      <a:br>
+                        <a:rPr lang="en-US" sz="1100" b="1" u="none" strike="noStrike" dirty="0">
+                          <a:effectLst/>
+                          <a:latin typeface="Consolas" panose="020B0609020204030204" pitchFamily="49" charset="0"/>
+                        </a:rPr>
+                      </a:br>
+                      <a:r>
+                        <a:rPr lang="en-US" sz="1100" b="1" u="none" strike="noStrike" dirty="0">
+                          <a:effectLst/>
+                          <a:latin typeface="Consolas" panose="020B0609020204030204" pitchFamily="49" charset="0"/>
+                        </a:rPr>
+                        <a:t>pos 0</a:t>
+                      </a:r>
+                      <a:endParaRPr lang="en-US" sz="1100" b="1" i="0" u="none" strike="noStrike" dirty="0">
+                        <a:solidFill>
+                          <a:srgbClr val="000000"/>
+                        </a:solidFill>
+                        <a:effectLst/>
+                        <a:latin typeface="Consolas" panose="020B0609020204030204" pitchFamily="49" charset="0"/>
+                      </a:endParaRPr>
+                    </a:p>
+                  </a:txBody>
+                  <a:tcPr marL="9525" marR="9525" marT="9525" marB="0" anchor="ctr">
+                    <a:lnL w="57150" cap="flat" cmpd="sng" algn="ctr">
+                      <a:solidFill>
+                        <a:schemeClr val="tx1"/>
+                      </a:solidFill>
+                      <a:prstDash val="solid"/>
+                      <a:round/>
+                      <a:headEnd type="none" w="med" len="med"/>
+                      <a:tailEnd type="none" w="med" len="med"/>
+                    </a:lnL>
+                    <a:lnR w="28575" cap="flat" cmpd="sng" algn="ctr">
+                      <a:solidFill>
+                        <a:schemeClr val="tx1"/>
+                      </a:solidFill>
+                      <a:prstDash val="solid"/>
+                      <a:round/>
+                      <a:headEnd type="none" w="med" len="med"/>
+                      <a:tailEnd type="none" w="med" len="med"/>
+                    </a:lnR>
+                    <a:lnT w="28575" cap="flat" cmpd="sng" algn="ctr">
+                      <a:solidFill>
+                        <a:schemeClr val="tx1"/>
+                      </a:solidFill>
+                      <a:prstDash val="solid"/>
+                      <a:round/>
+                      <a:headEnd type="none" w="med" len="med"/>
+                      <a:tailEnd type="none" w="med" len="med"/>
+                    </a:lnT>
+                    <a:lnB w="28575" cap="flat" cmpd="sng" algn="ctr">
+                      <a:solidFill>
+                        <a:schemeClr val="tx1"/>
+                      </a:solidFill>
+                      <a:prstDash val="solid"/>
+                      <a:round/>
+                      <a:headEnd type="none" w="med" len="med"/>
+                      <a:tailEnd type="none" w="med" len="med"/>
+                    </a:lnB>
+                    <a:lnTlToBr w="12700" cmpd="sng">
+                      <a:noFill/>
+                      <a:prstDash val="solid"/>
+                    </a:lnTlToBr>
+                    <a:lnBlToTr w="12700" cmpd="sng">
+                      <a:noFill/>
+                      <a:prstDash val="solid"/>
+                    </a:lnBlToTr>
+                    <a:noFill/>
+                  </a:tcPr>
+                </a:tc>
+                <a:tc>
+                  <a:txBody>
+                    <a:bodyPr/>
+                    <a:lstStyle/>
+                    <a:p>
+                      <a:pPr algn="ctr" fontAlgn="b"/>
+                      <a:r>
+                        <a:rPr lang="en-US" sz="1100" b="1" u="none" strike="noStrike" dirty="0">
+                          <a:solidFill>
+                            <a:srgbClr val="46B5C0"/>
+                          </a:solidFill>
+                          <a:effectLst/>
+                          <a:latin typeface="Consolas" panose="020B0609020204030204" pitchFamily="49" charset="0"/>
+                        </a:rPr>
+                        <a:t>sensor 1</a:t>
+                      </a:r>
+                      <a:br>
+                        <a:rPr lang="en-US" sz="1100" b="1" u="none" strike="noStrike" dirty="0">
+                          <a:effectLst/>
+                          <a:latin typeface="Consolas" panose="020B0609020204030204" pitchFamily="49" charset="0"/>
+                        </a:rPr>
+                      </a:br>
+                      <a:r>
+                        <a:rPr lang="en-US" sz="1100" b="1" u="none" strike="noStrike" dirty="0">
+                          <a:solidFill>
+                            <a:srgbClr val="7030A0"/>
+                          </a:solidFill>
+                          <a:effectLst/>
+                          <a:latin typeface="Consolas" panose="020B0609020204030204" pitchFamily="49" charset="0"/>
+                        </a:rPr>
+                        <a:t>group 2</a:t>
+                      </a:r>
+                      <a:br>
+                        <a:rPr lang="en-US" sz="1100" b="1" u="none" strike="noStrike" dirty="0">
+                          <a:effectLst/>
+                          <a:latin typeface="Consolas" panose="020B0609020204030204" pitchFamily="49" charset="0"/>
+                        </a:rPr>
+                      </a:br>
+                      <a:r>
+                        <a:rPr lang="en-US" sz="1100" b="1" u="none" strike="noStrike" dirty="0">
+                          <a:effectLst/>
+                          <a:latin typeface="Consolas" panose="020B0609020204030204" pitchFamily="49" charset="0"/>
+                        </a:rPr>
+                        <a:t>pos 1</a:t>
+                      </a:r>
+                      <a:endParaRPr lang="en-US" sz="1100" b="1" i="0" u="none" strike="noStrike" dirty="0">
+                        <a:solidFill>
+                          <a:srgbClr val="000000"/>
+                        </a:solidFill>
+                        <a:effectLst/>
+                        <a:latin typeface="Consolas" panose="020B0609020204030204" pitchFamily="49" charset="0"/>
+                      </a:endParaRPr>
+                    </a:p>
+                  </a:txBody>
+                  <a:tcPr marL="9525" marR="9525" marT="9525" marB="0" anchor="ctr">
+                    <a:lnL w="28575" cap="flat" cmpd="sng" algn="ctr">
+                      <a:solidFill>
+                        <a:schemeClr val="tx1"/>
+                      </a:solidFill>
+                      <a:prstDash val="solid"/>
+                      <a:round/>
+                      <a:headEnd type="none" w="med" len="med"/>
+                      <a:tailEnd type="none" w="med" len="med"/>
+                    </a:lnL>
+                    <a:lnR w="28575" cap="flat" cmpd="sng" algn="ctr">
+                      <a:solidFill>
+                        <a:schemeClr val="tx1"/>
+                      </a:solidFill>
+                      <a:prstDash val="solid"/>
+                      <a:round/>
+                      <a:headEnd type="none" w="med" len="med"/>
+                      <a:tailEnd type="none" w="med" len="med"/>
+                    </a:lnR>
+                    <a:lnT w="28575" cap="flat" cmpd="sng" algn="ctr">
+                      <a:solidFill>
+                        <a:schemeClr val="tx1"/>
+                      </a:solidFill>
+                      <a:prstDash val="solid"/>
+                      <a:round/>
+                      <a:headEnd type="none" w="med" len="med"/>
+                      <a:tailEnd type="none" w="med" len="med"/>
+                    </a:lnT>
+                    <a:lnB w="28575" cap="flat" cmpd="sng" algn="ctr">
+                      <a:solidFill>
+                        <a:schemeClr val="tx1"/>
+                      </a:solidFill>
+                      <a:prstDash val="solid"/>
+                      <a:round/>
+                      <a:headEnd type="none" w="med" len="med"/>
+                      <a:tailEnd type="none" w="med" len="med"/>
+                    </a:lnB>
+                    <a:lnTlToBr w="12700" cmpd="sng">
+                      <a:noFill/>
+                      <a:prstDash val="solid"/>
+                    </a:lnTlToBr>
+                    <a:lnBlToTr w="12700" cmpd="sng">
+                      <a:noFill/>
+                      <a:prstDash val="solid"/>
+                    </a:lnBlToTr>
+                    <a:noFill/>
+                  </a:tcPr>
+                </a:tc>
+                <a:tc>
+                  <a:txBody>
+                    <a:bodyPr/>
+                    <a:lstStyle/>
+                    <a:p>
+                      <a:pPr algn="ctr" fontAlgn="b"/>
+                      <a:r>
+                        <a:rPr lang="it-IT" sz="1100" b="1" u="none" strike="noStrike" dirty="0">
+                          <a:effectLst/>
+                          <a:latin typeface="Consolas" panose="020B0609020204030204" pitchFamily="49" charset="0"/>
+                        </a:rPr>
+                        <a:t>...</a:t>
+                      </a:r>
+                      <a:endParaRPr lang="it-IT" sz="1100" b="1" i="0" u="none" strike="noStrike" dirty="0">
+                        <a:solidFill>
+                          <a:srgbClr val="000000"/>
+                        </a:solidFill>
+                        <a:effectLst/>
+                        <a:latin typeface="Consolas" panose="020B0609020204030204" pitchFamily="49" charset="0"/>
+                      </a:endParaRPr>
+                    </a:p>
+                  </a:txBody>
+                  <a:tcPr marL="9525" marR="9525" marT="9525" marB="0" anchor="ctr">
+                    <a:lnL w="28575" cap="flat" cmpd="sng" algn="ctr">
+                      <a:solidFill>
+                        <a:schemeClr val="tx1"/>
+                      </a:solidFill>
+                      <a:prstDash val="solid"/>
+                      <a:round/>
+                      <a:headEnd type="none" w="med" len="med"/>
+                      <a:tailEnd type="none" w="med" len="med"/>
+                    </a:lnL>
+                    <a:lnR w="28575" cap="flat" cmpd="sng" algn="ctr">
+                      <a:solidFill>
+                        <a:schemeClr val="tx1"/>
+                      </a:solidFill>
+                      <a:prstDash val="solid"/>
+                      <a:round/>
+                      <a:headEnd type="none" w="med" len="med"/>
+                      <a:tailEnd type="none" w="med" len="med"/>
+                    </a:lnR>
+                    <a:lnT w="28575" cap="flat" cmpd="sng" algn="ctr">
+                      <a:solidFill>
+                        <a:schemeClr val="tx1"/>
+                      </a:solidFill>
+                      <a:prstDash val="solid"/>
+                      <a:round/>
+                      <a:headEnd type="none" w="med" len="med"/>
+                      <a:tailEnd type="none" w="med" len="med"/>
+                    </a:lnT>
+                    <a:lnB w="28575" cap="flat" cmpd="sng" algn="ctr">
+                      <a:solidFill>
+                        <a:schemeClr val="tx1"/>
+                      </a:solidFill>
+                      <a:prstDash val="solid"/>
+                      <a:round/>
+                      <a:headEnd type="none" w="med" len="med"/>
+                      <a:tailEnd type="none" w="med" len="med"/>
+                    </a:lnB>
+                    <a:lnTlToBr w="12700" cmpd="sng">
+                      <a:noFill/>
+                      <a:prstDash val="solid"/>
+                    </a:lnTlToBr>
+                    <a:lnBlToTr w="12700" cmpd="sng">
+                      <a:noFill/>
+                      <a:prstDash val="solid"/>
+                    </a:lnBlToTr>
+                    <a:noFill/>
+                  </a:tcPr>
+                </a:tc>
+                <a:tc>
+                  <a:txBody>
+                    <a:bodyPr/>
+                    <a:lstStyle/>
+                    <a:p>
+                      <a:pPr algn="ctr" fontAlgn="b"/>
+                      <a:r>
+                        <a:rPr lang="en-US" sz="1100" b="1" u="none" strike="noStrike" dirty="0">
+                          <a:solidFill>
+                            <a:srgbClr val="46B5C0"/>
+                          </a:solidFill>
+                          <a:effectLst/>
+                          <a:latin typeface="Consolas" panose="020B0609020204030204" pitchFamily="49" charset="0"/>
+                        </a:rPr>
+                        <a:t>sensor 1</a:t>
+                      </a:r>
+                      <a:br>
+                        <a:rPr lang="en-US" sz="1100" b="1" u="none" strike="noStrike" dirty="0">
+                          <a:effectLst/>
+                          <a:latin typeface="Consolas" panose="020B0609020204030204" pitchFamily="49" charset="0"/>
+                        </a:rPr>
+                      </a:br>
+                      <a:r>
+                        <a:rPr lang="en-US" sz="1100" b="1" u="none" strike="noStrike" dirty="0">
+                          <a:solidFill>
+                            <a:srgbClr val="7030A0"/>
+                          </a:solidFill>
+                          <a:effectLst/>
+                          <a:latin typeface="Consolas" panose="020B0609020204030204" pitchFamily="49" charset="0"/>
+                        </a:rPr>
+                        <a:t>group 2</a:t>
+                      </a:r>
+                      <a:br>
+                        <a:rPr lang="en-US" sz="1100" b="1" u="none" strike="noStrike" dirty="0">
+                          <a:effectLst/>
+                          <a:latin typeface="Consolas" panose="020B0609020204030204" pitchFamily="49" charset="0"/>
+                        </a:rPr>
+                      </a:br>
+                      <a:r>
+                        <a:rPr lang="en-US" sz="1100" b="1" u="none" strike="noStrike" dirty="0">
+                          <a:effectLst/>
+                          <a:latin typeface="Consolas" panose="020B0609020204030204" pitchFamily="49" charset="0"/>
+                        </a:rPr>
+                        <a:t>pos last</a:t>
+                      </a:r>
+                      <a:endParaRPr lang="en-US" sz="1100" b="1" i="0" u="none" strike="noStrike" dirty="0">
+                        <a:solidFill>
+                          <a:srgbClr val="000000"/>
+                        </a:solidFill>
+                        <a:effectLst/>
+                        <a:latin typeface="Consolas" panose="020B0609020204030204" pitchFamily="49" charset="0"/>
+                      </a:endParaRPr>
+                    </a:p>
+                  </a:txBody>
+                  <a:tcPr marL="9525" marR="9525" marT="9525" marB="0" anchor="ctr">
+                    <a:lnL w="28575" cap="flat" cmpd="sng" algn="ctr">
+                      <a:solidFill>
+                        <a:schemeClr val="tx1"/>
+                      </a:solidFill>
+                      <a:prstDash val="solid"/>
+                      <a:round/>
+                      <a:headEnd type="none" w="med" len="med"/>
+                      <a:tailEnd type="none" w="med" len="med"/>
+                    </a:lnL>
+                    <a:lnR w="28575" cap="flat" cmpd="sng" algn="ctr">
+                      <a:solidFill>
+                        <a:schemeClr val="tx1"/>
+                      </a:solidFill>
+                      <a:prstDash val="solid"/>
+                      <a:round/>
+                      <a:headEnd type="none" w="med" len="med"/>
+                      <a:tailEnd type="none" w="med" len="med"/>
+                    </a:lnR>
+                    <a:lnT w="28575" cap="flat" cmpd="sng" algn="ctr">
+                      <a:solidFill>
+                        <a:schemeClr val="tx1"/>
+                      </a:solidFill>
+                      <a:prstDash val="solid"/>
+                      <a:round/>
+                      <a:headEnd type="none" w="med" len="med"/>
+                      <a:tailEnd type="none" w="med" len="med"/>
+                    </a:lnT>
+                    <a:lnB w="28575" cap="flat" cmpd="sng" algn="ctr">
+                      <a:solidFill>
+                        <a:schemeClr val="tx1"/>
+                      </a:solidFill>
+                      <a:prstDash val="solid"/>
+                      <a:round/>
+                      <a:headEnd type="none" w="med" len="med"/>
+                      <a:tailEnd type="none" w="med" len="med"/>
+                    </a:lnB>
+                    <a:lnTlToBr w="12700" cmpd="sng">
+                      <a:noFill/>
+                      <a:prstDash val="solid"/>
+                    </a:lnTlToBr>
+                    <a:lnBlToTr w="12700" cmpd="sng">
+                      <a:noFill/>
+                      <a:prstDash val="solid"/>
+                    </a:lnBlToTr>
+                    <a:noFill/>
+                  </a:tcPr>
+                </a:tc>
+                <a:tc>
+                  <a:txBody>
+                    <a:bodyPr/>
+                    <a:lstStyle/>
+                    <a:p>
+                      <a:pPr algn="ctr" fontAlgn="b"/>
+                      <a:r>
+                        <a:rPr kumimoji="0" lang="it-IT" sz="1100" b="1" i="0" u="none" strike="noStrike" kern="1200" cap="none" spc="0" normalizeH="0" baseline="0" noProof="0">
+                          <a:ln>
+                            <a:noFill/>
+                          </a:ln>
+                          <a:solidFill>
+                            <a:prstClr val="black"/>
+                          </a:solidFill>
+                          <a:effectLst/>
+                          <a:uLnTx/>
+                          <a:uFillTx/>
+                          <a:latin typeface="Consolas" panose="020B0609020204030204" pitchFamily="49" charset="0"/>
+                          <a:ea typeface="+mn-ea"/>
+                          <a:cs typeface="+mn-cs"/>
+                        </a:rPr>
+                        <a:t>...</a:t>
+                      </a:r>
+                      <a:endParaRPr lang="it-IT" sz="1100" b="1" i="0" u="none" strike="noStrike" dirty="0">
+                        <a:solidFill>
+                          <a:srgbClr val="000000"/>
+                        </a:solidFill>
+                        <a:effectLst/>
+                        <a:latin typeface="Consolas" panose="020B0609020204030204" pitchFamily="49" charset="0"/>
+                      </a:endParaRPr>
+                    </a:p>
+                  </a:txBody>
+                  <a:tcPr marL="9525" marR="9525" marT="9525" marB="0" anchor="ctr">
+                    <a:lnL w="28575" cap="flat" cmpd="sng" algn="ctr">
+                      <a:solidFill>
+                        <a:schemeClr val="tx1"/>
+                      </a:solidFill>
+                      <a:prstDash val="solid"/>
+                      <a:round/>
+                      <a:headEnd type="none" w="med" len="med"/>
+                      <a:tailEnd type="none" w="med" len="med"/>
+                    </a:lnL>
+                    <a:lnR w="28575" cap="flat" cmpd="sng" algn="ctr">
+                      <a:solidFill>
+                        <a:schemeClr val="tx1"/>
+                      </a:solidFill>
+                      <a:prstDash val="solid"/>
+                      <a:round/>
+                      <a:headEnd type="none" w="med" len="med"/>
+                      <a:tailEnd type="none" w="med" len="med"/>
+                    </a:lnR>
+                    <a:lnT w="28575" cap="flat" cmpd="sng" algn="ctr">
+                      <a:solidFill>
+                        <a:schemeClr val="tx1"/>
+                      </a:solidFill>
+                      <a:prstDash val="solid"/>
+                      <a:round/>
+                      <a:headEnd type="none" w="med" len="med"/>
+                      <a:tailEnd type="none" w="med" len="med"/>
+                    </a:lnT>
+                    <a:lnB w="28575" cap="flat" cmpd="sng" algn="ctr">
+                      <a:solidFill>
+                        <a:schemeClr val="tx1"/>
+                      </a:solidFill>
+                      <a:prstDash val="solid"/>
+                      <a:round/>
+                      <a:headEnd type="none" w="med" len="med"/>
+                      <a:tailEnd type="none" w="med" len="med"/>
+                    </a:lnB>
+                    <a:lnTlToBr w="12700" cmpd="sng">
+                      <a:noFill/>
+                      <a:prstDash val="solid"/>
+                    </a:lnTlToBr>
+                    <a:lnBlToTr w="12700" cmpd="sng">
+                      <a:noFill/>
+                      <a:prstDash val="solid"/>
+                    </a:lnBlToTr>
+                    <a:noFill/>
+                  </a:tcPr>
+                </a:tc>
+                <a:extLst>
+                  <a:ext uri="{0D108BD9-81ED-4DB2-BD59-A6C34878D82A}">
+                    <a16:rowId xmlns:a16="http://schemas.microsoft.com/office/drawing/2014/main" val="3210644936"/>
+                  </a:ext>
+                </a:extLst>
+              </a:tr>
+              <a:tr h="684000">
+                <a:tc>
+                  <a:txBody>
+                    <a:bodyPr/>
+                    <a:lstStyle/>
+                    <a:p>
+                      <a:pPr algn="ctr" fontAlgn="b"/>
+                      <a:r>
+                        <a:rPr kumimoji="0" lang="it-IT" sz="1100" b="1" i="0" u="none" strike="noStrike" kern="1200" cap="none" spc="0" normalizeH="0" baseline="0" noProof="0">
+                          <a:ln>
+                            <a:noFill/>
+                          </a:ln>
+                          <a:solidFill>
+                            <a:prstClr val="black"/>
+                          </a:solidFill>
+                          <a:effectLst/>
+                          <a:uLnTx/>
+                          <a:uFillTx/>
+                          <a:latin typeface="Consolas" panose="020B0609020204030204" pitchFamily="49" charset="0"/>
+                          <a:ea typeface="+mn-ea"/>
+                          <a:cs typeface="+mn-cs"/>
+                        </a:rPr>
+                        <a:t>...</a:t>
+                      </a:r>
+                      <a:endParaRPr lang="en-US" sz="1100" b="1" i="0" u="none" strike="noStrike" dirty="0">
+                        <a:solidFill>
+                          <a:srgbClr val="000000"/>
+                        </a:solidFill>
+                        <a:effectLst/>
+                        <a:latin typeface="Consolas" panose="020B0609020204030204" pitchFamily="49" charset="0"/>
+                      </a:endParaRPr>
+                    </a:p>
+                  </a:txBody>
+                  <a:tcPr marL="9525" marR="9525" marT="9525" marB="0" anchor="ctr">
+                    <a:lnL w="28575" cap="flat" cmpd="sng" algn="ctr">
+                      <a:solidFill>
+                        <a:schemeClr val="tx1"/>
+                      </a:solidFill>
+                      <a:prstDash val="solid"/>
+                      <a:round/>
+                      <a:headEnd type="none" w="med" len="med"/>
+                      <a:tailEnd type="none" w="med" len="med"/>
+                    </a:lnL>
+                    <a:lnR w="28575" cap="flat" cmpd="sng" algn="ctr">
+                      <a:solidFill>
+                        <a:schemeClr val="tx1"/>
+                      </a:solidFill>
+                      <a:prstDash val="solid"/>
+                      <a:round/>
+                      <a:headEnd type="none" w="med" len="med"/>
+                      <a:tailEnd type="none" w="med" len="med"/>
+                    </a:lnR>
+                    <a:lnT w="28575" cap="flat" cmpd="sng" algn="ctr">
+                      <a:solidFill>
+                        <a:schemeClr val="tx1"/>
+                      </a:solidFill>
+                      <a:prstDash val="solid"/>
+                      <a:round/>
+                      <a:headEnd type="none" w="med" len="med"/>
+                      <a:tailEnd type="none" w="med" len="med"/>
+                    </a:lnT>
+                    <a:lnB w="28575" cap="flat" cmpd="sng" algn="ctr">
+                      <a:solidFill>
+                        <a:schemeClr val="tx1"/>
+                      </a:solidFill>
+                      <a:prstDash val="solid"/>
+                      <a:round/>
+                      <a:headEnd type="none" w="med" len="med"/>
+                      <a:tailEnd type="none" w="med" len="med"/>
+                    </a:lnB>
+                    <a:lnTlToBr w="12700" cmpd="sng">
+                      <a:noFill/>
+                      <a:prstDash val="solid"/>
+                    </a:lnTlToBr>
+                    <a:lnBlToTr w="12700" cmpd="sng">
+                      <a:noFill/>
+                      <a:prstDash val="solid"/>
+                    </a:lnBlToTr>
+                    <a:noFill/>
+                  </a:tcPr>
+                </a:tc>
+                <a:tc>
+                  <a:txBody>
+                    <a:bodyPr/>
+                    <a:lstStyle/>
+                    <a:p>
+                      <a:pPr algn="ctr" fontAlgn="b"/>
+                      <a:r>
+                        <a:rPr kumimoji="0" lang="it-IT" sz="1100" b="1" i="0" u="none" strike="noStrike" kern="1200" cap="none" spc="0" normalizeH="0" baseline="0" noProof="0">
+                          <a:ln>
+                            <a:noFill/>
+                          </a:ln>
+                          <a:solidFill>
+                            <a:prstClr val="black"/>
+                          </a:solidFill>
+                          <a:effectLst/>
+                          <a:uLnTx/>
+                          <a:uFillTx/>
+                          <a:latin typeface="Consolas" panose="020B0609020204030204" pitchFamily="49" charset="0"/>
+                          <a:ea typeface="+mn-ea"/>
+                          <a:cs typeface="+mn-cs"/>
+                        </a:rPr>
+                        <a:t>...</a:t>
+                      </a:r>
+                      <a:endParaRPr lang="en-US" sz="1100" b="1" i="0" u="none" strike="noStrike" dirty="0">
+                        <a:solidFill>
+                          <a:srgbClr val="000000"/>
+                        </a:solidFill>
+                        <a:effectLst/>
+                        <a:latin typeface="Consolas" panose="020B0609020204030204" pitchFamily="49" charset="0"/>
+                      </a:endParaRPr>
+                    </a:p>
+                  </a:txBody>
+                  <a:tcPr marL="9525" marR="9525" marT="9525" marB="0" anchor="ctr">
+                    <a:lnL w="28575" cap="flat" cmpd="sng" algn="ctr">
+                      <a:solidFill>
+                        <a:schemeClr val="tx1"/>
+                      </a:solidFill>
+                      <a:prstDash val="solid"/>
+                      <a:round/>
+                      <a:headEnd type="none" w="med" len="med"/>
+                      <a:tailEnd type="none" w="med" len="med"/>
+                    </a:lnL>
+                    <a:lnR w="28575" cap="flat" cmpd="sng" algn="ctr">
+                      <a:solidFill>
+                        <a:schemeClr val="tx1"/>
+                      </a:solidFill>
+                      <a:prstDash val="solid"/>
+                      <a:round/>
+                      <a:headEnd type="none" w="med" len="med"/>
+                      <a:tailEnd type="none" w="med" len="med"/>
+                    </a:lnR>
+                    <a:lnT w="28575" cap="flat" cmpd="sng" algn="ctr">
+                      <a:solidFill>
+                        <a:schemeClr val="tx1"/>
+                      </a:solidFill>
+                      <a:prstDash val="solid"/>
+                      <a:round/>
+                      <a:headEnd type="none" w="med" len="med"/>
+                      <a:tailEnd type="none" w="med" len="med"/>
+                    </a:lnT>
+                    <a:lnB w="28575" cap="flat" cmpd="sng" algn="ctr">
+                      <a:solidFill>
+                        <a:schemeClr val="tx1"/>
+                      </a:solidFill>
+                      <a:prstDash val="solid"/>
+                      <a:round/>
+                      <a:headEnd type="none" w="med" len="med"/>
+                      <a:tailEnd type="none" w="med" len="med"/>
+                    </a:lnB>
+                    <a:lnTlToBr w="12700" cmpd="sng">
+                      <a:noFill/>
+                      <a:prstDash val="solid"/>
+                    </a:lnTlToBr>
+                    <a:lnBlToTr w="12700" cmpd="sng">
+                      <a:noFill/>
+                      <a:prstDash val="solid"/>
+                    </a:lnBlToTr>
+                    <a:noFill/>
+                  </a:tcPr>
+                </a:tc>
+                <a:tc>
+                  <a:txBody>
+                    <a:bodyPr/>
+                    <a:lstStyle/>
+                    <a:p>
+                      <a:pPr algn="ctr" fontAlgn="b"/>
+                      <a:r>
+                        <a:rPr kumimoji="0" lang="it-IT" sz="1100" b="1" i="0" u="none" strike="noStrike" kern="1200" cap="none" spc="0" normalizeH="0" baseline="0" noProof="0" dirty="0">
+                          <a:ln>
+                            <a:noFill/>
+                          </a:ln>
+                          <a:solidFill>
+                            <a:prstClr val="black"/>
+                          </a:solidFill>
+                          <a:effectLst/>
+                          <a:uLnTx/>
+                          <a:uFillTx/>
+                          <a:latin typeface="Consolas" panose="020B0609020204030204" pitchFamily="49" charset="0"/>
+                          <a:ea typeface="+mn-ea"/>
+                          <a:cs typeface="+mn-cs"/>
+                        </a:rPr>
+                        <a:t>...</a:t>
+                      </a:r>
+                      <a:endParaRPr lang="it-IT" sz="1100" b="1" i="0" u="none" strike="noStrike" dirty="0">
+                        <a:solidFill>
+                          <a:srgbClr val="000000"/>
+                        </a:solidFill>
+                        <a:effectLst/>
+                        <a:latin typeface="Consolas" panose="020B0609020204030204" pitchFamily="49" charset="0"/>
+                      </a:endParaRPr>
+                    </a:p>
+                  </a:txBody>
+                  <a:tcPr marL="9525" marR="9525" marT="9525" marB="0" anchor="ctr">
+                    <a:lnL w="28575" cap="flat" cmpd="sng" algn="ctr">
+                      <a:solidFill>
+                        <a:schemeClr val="tx1"/>
+                      </a:solidFill>
+                      <a:prstDash val="solid"/>
+                      <a:round/>
+                      <a:headEnd type="none" w="med" len="med"/>
+                      <a:tailEnd type="none" w="med" len="med"/>
+                    </a:lnL>
+                    <a:lnR w="28575" cap="flat" cmpd="sng" algn="ctr">
+                      <a:solidFill>
+                        <a:schemeClr val="tx1"/>
+                      </a:solidFill>
+                      <a:prstDash val="solid"/>
+                      <a:round/>
+                      <a:headEnd type="none" w="med" len="med"/>
+                      <a:tailEnd type="none" w="med" len="med"/>
+                    </a:lnR>
+                    <a:lnT w="28575" cap="flat" cmpd="sng" algn="ctr">
+                      <a:solidFill>
+                        <a:schemeClr val="tx1"/>
+                      </a:solidFill>
+                      <a:prstDash val="solid"/>
+                      <a:round/>
+                      <a:headEnd type="none" w="med" len="med"/>
+                      <a:tailEnd type="none" w="med" len="med"/>
+                    </a:lnT>
+                    <a:lnB w="28575" cap="flat" cmpd="sng" algn="ctr">
+                      <a:solidFill>
+                        <a:schemeClr val="tx1"/>
+                      </a:solidFill>
+                      <a:prstDash val="solid"/>
+                      <a:round/>
+                      <a:headEnd type="none" w="med" len="med"/>
+                      <a:tailEnd type="none" w="med" len="med"/>
+                    </a:lnB>
+                    <a:lnTlToBr w="12700" cmpd="sng">
+                      <a:noFill/>
+                      <a:prstDash val="solid"/>
+                    </a:lnTlToBr>
+                    <a:lnBlToTr w="12700" cmpd="sng">
+                      <a:noFill/>
+                      <a:prstDash val="solid"/>
+                    </a:lnBlToTr>
+                    <a:noFill/>
+                  </a:tcPr>
+                </a:tc>
+                <a:tc>
+                  <a:txBody>
+                    <a:bodyPr/>
+                    <a:lstStyle/>
+                    <a:p>
+                      <a:pPr algn="ctr" fontAlgn="b"/>
+                      <a:r>
+                        <a:rPr kumimoji="0" lang="it-IT" sz="1100" b="1" i="0" u="none" strike="noStrike" kern="1200" cap="none" spc="0" normalizeH="0" baseline="0" noProof="0" dirty="0">
+                          <a:ln>
+                            <a:noFill/>
+                          </a:ln>
+                          <a:solidFill>
+                            <a:prstClr val="black"/>
+                          </a:solidFill>
+                          <a:effectLst/>
+                          <a:uLnTx/>
+                          <a:uFillTx/>
+                          <a:latin typeface="Consolas" panose="020B0609020204030204" pitchFamily="49" charset="0"/>
+                          <a:ea typeface="+mn-ea"/>
+                          <a:cs typeface="+mn-cs"/>
+                        </a:rPr>
+                        <a:t>...</a:t>
+                      </a:r>
+                      <a:endParaRPr lang="en-US" sz="1100" b="1" i="0" u="none" strike="noStrike" dirty="0">
+                        <a:solidFill>
+                          <a:srgbClr val="000000"/>
+                        </a:solidFill>
+                        <a:effectLst/>
+                        <a:latin typeface="Consolas" panose="020B0609020204030204" pitchFamily="49" charset="0"/>
+                      </a:endParaRPr>
+                    </a:p>
+                  </a:txBody>
+                  <a:tcPr marL="9525" marR="9525" marT="9525" marB="0" anchor="ctr">
+                    <a:lnL w="28575" cap="flat" cmpd="sng" algn="ctr">
+                      <a:solidFill>
+                        <a:schemeClr val="tx1"/>
+                      </a:solidFill>
+                      <a:prstDash val="solid"/>
+                      <a:round/>
+                      <a:headEnd type="none" w="med" len="med"/>
+                      <a:tailEnd type="none" w="med" len="med"/>
+                    </a:lnL>
+                    <a:lnR w="57150" cap="flat" cmpd="sng" algn="ctr">
+                      <a:solidFill>
+                        <a:schemeClr val="tx1"/>
+                      </a:solidFill>
+                      <a:prstDash val="solid"/>
+                      <a:round/>
+                      <a:headEnd type="none" w="med" len="med"/>
+                      <a:tailEnd type="none" w="med" len="med"/>
+                    </a:lnR>
+                    <a:lnT w="28575" cap="flat" cmpd="sng" algn="ctr">
+                      <a:solidFill>
+                        <a:schemeClr val="tx1"/>
+                      </a:solidFill>
+                      <a:prstDash val="solid"/>
+                      <a:round/>
+                      <a:headEnd type="none" w="med" len="med"/>
+                      <a:tailEnd type="none" w="med" len="med"/>
+                    </a:lnT>
+                    <a:lnB w="28575" cap="flat" cmpd="sng" algn="ctr">
+                      <a:solidFill>
+                        <a:schemeClr val="tx1"/>
+                      </a:solidFill>
+                      <a:prstDash val="solid"/>
+                      <a:round/>
+                      <a:headEnd type="none" w="med" len="med"/>
+                      <a:tailEnd type="none" w="med" len="med"/>
+                    </a:lnB>
+                    <a:lnTlToBr w="12700" cmpd="sng">
+                      <a:noFill/>
+                      <a:prstDash val="solid"/>
+                    </a:lnTlToBr>
+                    <a:lnBlToTr w="12700" cmpd="sng">
+                      <a:noFill/>
+                      <a:prstDash val="solid"/>
+                    </a:lnBlToTr>
+                    <a:noFill/>
+                  </a:tcPr>
+                </a:tc>
+                <a:tc>
+                  <a:txBody>
+                    <a:bodyPr/>
+                    <a:lstStyle/>
+                    <a:p>
+                      <a:pPr algn="ctr" fontAlgn="b"/>
+                      <a:r>
+                        <a:rPr kumimoji="0" lang="it-IT" sz="1100" b="1" i="0" u="none" strike="noStrike" kern="1200" cap="none" spc="0" normalizeH="0" baseline="0" noProof="0">
+                          <a:ln>
+                            <a:noFill/>
+                          </a:ln>
+                          <a:solidFill>
+                            <a:prstClr val="black"/>
+                          </a:solidFill>
+                          <a:effectLst/>
+                          <a:uLnTx/>
+                          <a:uFillTx/>
+                          <a:latin typeface="Consolas" panose="020B0609020204030204" pitchFamily="49" charset="0"/>
+                          <a:ea typeface="+mn-ea"/>
+                          <a:cs typeface="+mn-cs"/>
+                        </a:rPr>
+                        <a:t>...</a:t>
+                      </a:r>
+                      <a:endParaRPr lang="en-US" sz="1100" b="1" i="0" u="none" strike="noStrike" dirty="0">
+                        <a:solidFill>
+                          <a:srgbClr val="000000"/>
+                        </a:solidFill>
+                        <a:effectLst/>
+                        <a:latin typeface="Consolas" panose="020B0609020204030204" pitchFamily="49" charset="0"/>
+                      </a:endParaRPr>
+                    </a:p>
+                  </a:txBody>
+                  <a:tcPr marL="9525" marR="9525" marT="9525" marB="0" anchor="ctr">
+                    <a:lnL w="57150" cap="flat" cmpd="sng" algn="ctr">
+                      <a:solidFill>
+                        <a:schemeClr val="tx1"/>
+                      </a:solidFill>
+                      <a:prstDash val="solid"/>
+                      <a:round/>
+                      <a:headEnd type="none" w="med" len="med"/>
+                      <a:tailEnd type="none" w="med" len="med"/>
+                    </a:lnL>
+                    <a:lnR w="28575" cap="flat" cmpd="sng" algn="ctr">
+                      <a:solidFill>
+                        <a:schemeClr val="tx1"/>
+                      </a:solidFill>
+                      <a:prstDash val="solid"/>
+                      <a:round/>
+                      <a:headEnd type="none" w="med" len="med"/>
+                      <a:tailEnd type="none" w="med" len="med"/>
+                    </a:lnR>
+                    <a:lnT w="28575" cap="flat" cmpd="sng" algn="ctr">
+                      <a:solidFill>
+                        <a:schemeClr val="tx1"/>
+                      </a:solidFill>
+                      <a:prstDash val="solid"/>
+                      <a:round/>
+                      <a:headEnd type="none" w="med" len="med"/>
+                      <a:tailEnd type="none" w="med" len="med"/>
+                    </a:lnT>
+                    <a:lnB w="28575" cap="flat" cmpd="sng" algn="ctr">
+                      <a:solidFill>
+                        <a:schemeClr val="tx1"/>
+                      </a:solidFill>
+                      <a:prstDash val="solid"/>
+                      <a:round/>
+                      <a:headEnd type="none" w="med" len="med"/>
+                      <a:tailEnd type="none" w="med" len="med"/>
+                    </a:lnB>
+                    <a:lnTlToBr w="12700" cmpd="sng">
+                      <a:noFill/>
+                      <a:prstDash val="solid"/>
+                    </a:lnTlToBr>
+                    <a:lnBlToTr w="12700" cmpd="sng">
+                      <a:noFill/>
+                      <a:prstDash val="solid"/>
+                    </a:lnBlToTr>
+                    <a:noFill/>
+                  </a:tcPr>
+                </a:tc>
+                <a:tc>
+                  <a:txBody>
+                    <a:bodyPr/>
+                    <a:lstStyle/>
+                    <a:p>
+                      <a:pPr algn="ctr" fontAlgn="b"/>
+                      <a:r>
+                        <a:rPr kumimoji="0" lang="it-IT" sz="1100" b="1" i="0" u="none" strike="noStrike" kern="1200" cap="none" spc="0" normalizeH="0" baseline="0" noProof="0">
+                          <a:ln>
+                            <a:noFill/>
+                          </a:ln>
+                          <a:solidFill>
+                            <a:prstClr val="black"/>
+                          </a:solidFill>
+                          <a:effectLst/>
+                          <a:uLnTx/>
+                          <a:uFillTx/>
+                          <a:latin typeface="Consolas" panose="020B0609020204030204" pitchFamily="49" charset="0"/>
+                          <a:ea typeface="+mn-ea"/>
+                          <a:cs typeface="+mn-cs"/>
+                        </a:rPr>
+                        <a:t>...</a:t>
+                      </a:r>
+                      <a:endParaRPr lang="en-US" sz="1100" b="1" i="0" u="none" strike="noStrike" dirty="0">
+                        <a:solidFill>
+                          <a:srgbClr val="000000"/>
+                        </a:solidFill>
+                        <a:effectLst/>
+                        <a:latin typeface="Consolas" panose="020B0609020204030204" pitchFamily="49" charset="0"/>
+                      </a:endParaRPr>
+                    </a:p>
+                  </a:txBody>
+                  <a:tcPr marL="9525" marR="9525" marT="9525" marB="0" anchor="ctr">
+                    <a:lnL w="28575" cap="flat" cmpd="sng" algn="ctr">
+                      <a:solidFill>
+                        <a:schemeClr val="tx1"/>
+                      </a:solidFill>
+                      <a:prstDash val="solid"/>
+                      <a:round/>
+                      <a:headEnd type="none" w="med" len="med"/>
+                      <a:tailEnd type="none" w="med" len="med"/>
+                    </a:lnL>
+                    <a:lnR w="28575" cap="flat" cmpd="sng" algn="ctr">
+                      <a:solidFill>
+                        <a:schemeClr val="tx1"/>
+                      </a:solidFill>
+                      <a:prstDash val="solid"/>
+                      <a:round/>
+                      <a:headEnd type="none" w="med" len="med"/>
+                      <a:tailEnd type="none" w="med" len="med"/>
+                    </a:lnR>
+                    <a:lnT w="28575" cap="flat" cmpd="sng" algn="ctr">
+                      <a:solidFill>
+                        <a:schemeClr val="tx1"/>
+                      </a:solidFill>
+                      <a:prstDash val="solid"/>
+                      <a:round/>
+                      <a:headEnd type="none" w="med" len="med"/>
+                      <a:tailEnd type="none" w="med" len="med"/>
+                    </a:lnT>
+                    <a:lnB w="28575" cap="flat" cmpd="sng" algn="ctr">
+                      <a:solidFill>
+                        <a:schemeClr val="tx1"/>
+                      </a:solidFill>
+                      <a:prstDash val="solid"/>
+                      <a:round/>
+                      <a:headEnd type="none" w="med" len="med"/>
+                      <a:tailEnd type="none" w="med" len="med"/>
+                    </a:lnB>
+                    <a:lnTlToBr w="12700" cmpd="sng">
+                      <a:noFill/>
+                      <a:prstDash val="solid"/>
+                    </a:lnTlToBr>
+                    <a:lnBlToTr w="12700" cmpd="sng">
+                      <a:noFill/>
+                      <a:prstDash val="solid"/>
+                    </a:lnBlToTr>
+                    <a:noFill/>
+                  </a:tcPr>
+                </a:tc>
+                <a:tc>
+                  <a:txBody>
+                    <a:bodyPr/>
+                    <a:lstStyle/>
+                    <a:p>
+                      <a:pPr algn="ctr" fontAlgn="b"/>
+                      <a:r>
+                        <a:rPr kumimoji="0" lang="it-IT" sz="1100" b="1" i="0" u="none" strike="noStrike" kern="1200" cap="none" spc="0" normalizeH="0" baseline="0" noProof="0">
+                          <a:ln>
+                            <a:noFill/>
+                          </a:ln>
+                          <a:solidFill>
+                            <a:prstClr val="black"/>
+                          </a:solidFill>
+                          <a:effectLst/>
+                          <a:uLnTx/>
+                          <a:uFillTx/>
+                          <a:latin typeface="Consolas" panose="020B0609020204030204" pitchFamily="49" charset="0"/>
+                          <a:ea typeface="+mn-ea"/>
+                          <a:cs typeface="+mn-cs"/>
+                        </a:rPr>
+                        <a:t>...</a:t>
+                      </a:r>
+                      <a:endParaRPr lang="it-IT" sz="1100" b="1" i="0" u="none" strike="noStrike" dirty="0">
+                        <a:solidFill>
+                          <a:srgbClr val="000000"/>
+                        </a:solidFill>
+                        <a:effectLst/>
+                        <a:latin typeface="Consolas" panose="020B0609020204030204" pitchFamily="49" charset="0"/>
+                      </a:endParaRPr>
+                    </a:p>
+                  </a:txBody>
+                  <a:tcPr marL="9525" marR="9525" marT="9525" marB="0" anchor="ctr">
+                    <a:lnL w="28575" cap="flat" cmpd="sng" algn="ctr">
+                      <a:solidFill>
+                        <a:schemeClr val="tx1"/>
+                      </a:solidFill>
+                      <a:prstDash val="solid"/>
+                      <a:round/>
+                      <a:headEnd type="none" w="med" len="med"/>
+                      <a:tailEnd type="none" w="med" len="med"/>
+                    </a:lnL>
+                    <a:lnR w="28575" cap="flat" cmpd="sng" algn="ctr">
+                      <a:solidFill>
+                        <a:schemeClr val="tx1"/>
+                      </a:solidFill>
+                      <a:prstDash val="solid"/>
+                      <a:round/>
+                      <a:headEnd type="none" w="med" len="med"/>
+                      <a:tailEnd type="none" w="med" len="med"/>
+                    </a:lnR>
+                    <a:lnT w="28575" cap="flat" cmpd="sng" algn="ctr">
+                      <a:solidFill>
+                        <a:schemeClr val="tx1"/>
+                      </a:solidFill>
+                      <a:prstDash val="solid"/>
+                      <a:round/>
+                      <a:headEnd type="none" w="med" len="med"/>
+                      <a:tailEnd type="none" w="med" len="med"/>
+                    </a:lnT>
+                    <a:lnB w="28575" cap="flat" cmpd="sng" algn="ctr">
+                      <a:solidFill>
+                        <a:schemeClr val="tx1"/>
+                      </a:solidFill>
+                      <a:prstDash val="solid"/>
+                      <a:round/>
+                      <a:headEnd type="none" w="med" len="med"/>
+                      <a:tailEnd type="none" w="med" len="med"/>
+                    </a:lnB>
+                    <a:lnTlToBr w="12700" cmpd="sng">
+                      <a:noFill/>
+                      <a:prstDash val="solid"/>
+                    </a:lnTlToBr>
+                    <a:lnBlToTr w="12700" cmpd="sng">
+                      <a:noFill/>
+                      <a:prstDash val="solid"/>
+                    </a:lnBlToTr>
+                    <a:noFill/>
+                  </a:tcPr>
+                </a:tc>
+                <a:tc>
+                  <a:txBody>
+                    <a:bodyPr/>
+                    <a:lstStyle/>
+                    <a:p>
+                      <a:pPr algn="ctr" fontAlgn="b"/>
+                      <a:r>
+                        <a:rPr kumimoji="0" lang="it-IT" sz="1100" b="1" i="0" u="none" strike="noStrike" kern="1200" cap="none" spc="0" normalizeH="0" baseline="0" noProof="0">
+                          <a:ln>
+                            <a:noFill/>
+                          </a:ln>
+                          <a:solidFill>
+                            <a:prstClr val="black"/>
+                          </a:solidFill>
+                          <a:effectLst/>
+                          <a:uLnTx/>
+                          <a:uFillTx/>
+                          <a:latin typeface="Consolas" panose="020B0609020204030204" pitchFamily="49" charset="0"/>
+                          <a:ea typeface="+mn-ea"/>
+                          <a:cs typeface="+mn-cs"/>
+                        </a:rPr>
+                        <a:t>...</a:t>
+                      </a:r>
+                      <a:endParaRPr lang="en-US" sz="1100" b="1" i="0" u="none" strike="noStrike" dirty="0">
+                        <a:solidFill>
+                          <a:srgbClr val="000000"/>
+                        </a:solidFill>
+                        <a:effectLst/>
+                        <a:latin typeface="Consolas" panose="020B0609020204030204" pitchFamily="49" charset="0"/>
+                      </a:endParaRPr>
+                    </a:p>
+                  </a:txBody>
+                  <a:tcPr marL="9525" marR="9525" marT="9525" marB="0" anchor="ctr">
+                    <a:lnL w="28575" cap="flat" cmpd="sng" algn="ctr">
+                      <a:solidFill>
+                        <a:schemeClr val="tx1"/>
+                      </a:solidFill>
+                      <a:prstDash val="solid"/>
+                      <a:round/>
+                      <a:headEnd type="none" w="med" len="med"/>
+                      <a:tailEnd type="none" w="med" len="med"/>
+                    </a:lnL>
+                    <a:lnR w="28575" cap="flat" cmpd="sng" algn="ctr">
+                      <a:solidFill>
+                        <a:schemeClr val="tx1"/>
+                      </a:solidFill>
+                      <a:prstDash val="solid"/>
+                      <a:round/>
+                      <a:headEnd type="none" w="med" len="med"/>
+                      <a:tailEnd type="none" w="med" len="med"/>
+                    </a:lnR>
+                    <a:lnT w="28575" cap="flat" cmpd="sng" algn="ctr">
+                      <a:solidFill>
+                        <a:schemeClr val="tx1"/>
+                      </a:solidFill>
+                      <a:prstDash val="solid"/>
+                      <a:round/>
+                      <a:headEnd type="none" w="med" len="med"/>
+                      <a:tailEnd type="none" w="med" len="med"/>
+                    </a:lnT>
+                    <a:lnB w="28575" cap="flat" cmpd="sng" algn="ctr">
+                      <a:solidFill>
+                        <a:schemeClr val="tx1"/>
+                      </a:solidFill>
+                      <a:prstDash val="solid"/>
+                      <a:round/>
+                      <a:headEnd type="none" w="med" len="med"/>
+                      <a:tailEnd type="none" w="med" len="med"/>
+                    </a:lnB>
+                    <a:lnTlToBr w="12700" cmpd="sng">
+                      <a:noFill/>
+                      <a:prstDash val="solid"/>
+                    </a:lnTlToBr>
+                    <a:lnBlToTr w="12700" cmpd="sng">
+                      <a:noFill/>
+                      <a:prstDash val="solid"/>
+                    </a:lnBlToTr>
+                    <a:noFill/>
+                  </a:tcPr>
+                </a:tc>
+                <a:tc>
+                  <a:txBody>
+                    <a:bodyPr/>
+                    <a:lstStyle/>
+                    <a:p>
+                      <a:pPr algn="ctr" fontAlgn="b"/>
+                      <a:r>
+                        <a:rPr kumimoji="0" lang="it-IT" sz="1100" b="1" i="0" u="none" strike="noStrike" kern="1200" cap="none" spc="0" normalizeH="0" baseline="0" noProof="0" dirty="0">
+                          <a:ln>
+                            <a:noFill/>
+                          </a:ln>
+                          <a:solidFill>
+                            <a:prstClr val="black"/>
+                          </a:solidFill>
+                          <a:effectLst/>
+                          <a:uLnTx/>
+                          <a:uFillTx/>
+                          <a:latin typeface="Consolas" panose="020B0609020204030204" pitchFamily="49" charset="0"/>
+                          <a:ea typeface="+mn-ea"/>
+                          <a:cs typeface="+mn-cs"/>
+                        </a:rPr>
+                        <a:t>...</a:t>
+                      </a:r>
+                      <a:endParaRPr lang="it-IT" sz="1100" b="1" i="0" u="none" strike="noStrike" dirty="0">
+                        <a:solidFill>
+                          <a:srgbClr val="000000"/>
+                        </a:solidFill>
+                        <a:effectLst/>
+                        <a:latin typeface="Consolas" panose="020B0609020204030204" pitchFamily="49" charset="0"/>
+                      </a:endParaRPr>
+                    </a:p>
+                  </a:txBody>
+                  <a:tcPr marL="9525" marR="9525" marT="9525" marB="0" anchor="ctr">
+                    <a:lnL w="28575" cap="flat" cmpd="sng" algn="ctr">
+                      <a:solidFill>
+                        <a:schemeClr val="tx1"/>
+                      </a:solidFill>
+                      <a:prstDash val="solid"/>
+                      <a:round/>
+                      <a:headEnd type="none" w="med" len="med"/>
+                      <a:tailEnd type="none" w="med" len="med"/>
+                    </a:lnL>
+                    <a:lnR w="28575" cap="flat" cmpd="sng" algn="ctr">
+                      <a:solidFill>
+                        <a:schemeClr val="tx1"/>
+                      </a:solidFill>
+                      <a:prstDash val="solid"/>
+                      <a:round/>
+                      <a:headEnd type="none" w="med" len="med"/>
+                      <a:tailEnd type="none" w="med" len="med"/>
+                    </a:lnR>
+                    <a:lnT w="28575" cap="flat" cmpd="sng" algn="ctr">
+                      <a:solidFill>
+                        <a:schemeClr val="tx1"/>
+                      </a:solidFill>
+                      <a:prstDash val="solid"/>
+                      <a:round/>
+                      <a:headEnd type="none" w="med" len="med"/>
+                      <a:tailEnd type="none" w="med" len="med"/>
+                    </a:lnT>
+                    <a:lnB w="28575" cap="flat" cmpd="sng" algn="ctr">
+                      <a:solidFill>
+                        <a:schemeClr val="tx1"/>
+                      </a:solidFill>
+                      <a:prstDash val="solid"/>
+                      <a:round/>
+                      <a:headEnd type="none" w="med" len="med"/>
+                      <a:tailEnd type="none" w="med" len="med"/>
+                    </a:lnB>
+                    <a:lnTlToBr w="12700" cmpd="sng">
+                      <a:noFill/>
+                      <a:prstDash val="solid"/>
+                    </a:lnTlToBr>
+                    <a:lnBlToTr w="12700" cmpd="sng">
+                      <a:noFill/>
+                      <a:prstDash val="solid"/>
+                    </a:lnBlToTr>
+                    <a:noFill/>
+                  </a:tcPr>
+                </a:tc>
+                <a:extLst>
+                  <a:ext uri="{0D108BD9-81ED-4DB2-BD59-A6C34878D82A}">
+                    <a16:rowId xmlns:a16="http://schemas.microsoft.com/office/drawing/2014/main" val="304969504"/>
+                  </a:ext>
+                </a:extLst>
+              </a:tr>
+            </a:tbl>
+          </a:graphicData>
+        </a:graphic>
+      </p:graphicFrame>
+    </p:spTree>
+    <p:extLst>
+      <p:ext uri="{BB962C8B-B14F-4D97-AF65-F5344CB8AC3E}">
+        <p14:creationId xmlns:p14="http://schemas.microsoft.com/office/powerpoint/2010/main" val="222752322"/>
+      </p:ext>
+    </p:extLst>
+  </p:cSld>
+  <p:clrMapOvr>
+    <a:masterClrMapping/>
+  </p:clrMapOvr>
+</p:sld>
+</file>
+
 <file path=ppt/theme/theme1.xml><?xml version="1.0" encoding="utf-8"?>
 <a:theme xmlns:a="http://schemas.openxmlformats.org/drawingml/2006/main" name="Office Theme">
   <a:themeElements>

</xml_diff>

<commit_message>
Modified one of the readme images
</commit_message>
<xml_diff>
--- a/documentation/AlgorithmPresentation.pptx
+++ b/documentation/AlgorithmPresentation.pptx
@@ -10949,7 +10949,7 @@
           <p:nvPr>
             <p:extLst>
               <p:ext uri="{D42A27DB-BD31-4B8C-83A1-F6EECF244321}">
-                <p14:modId xmlns:p14="http://schemas.microsoft.com/office/powerpoint/2010/main" val="742033334"/>
+                <p14:modId xmlns:p14="http://schemas.microsoft.com/office/powerpoint/2010/main" val="3391258617"/>
               </p:ext>
             </p:extLst>
           </p:nvPr>
@@ -11338,7 +11338,9 @@
                             <a:noFill/>
                           </a:ln>
                           <a:solidFill>
-                            <a:prstClr val="black"/>
+                            <a:schemeClr val="bg1">
+                              <a:lumMod val="50000"/>
+                            </a:schemeClr>
                           </a:solidFill>
                           <a:effectLst/>
                           <a:uLnTx/>
@@ -11351,7 +11353,9 @@
                       </a:r>
                       <a:endParaRPr lang="it-IT" sz="1100" b="1" i="0" u="none" strike="noStrike" dirty="0">
                         <a:solidFill>
-                          <a:srgbClr val="000000"/>
+                          <a:schemeClr val="bg1">
+                            <a:lumMod val="50000"/>
+                          </a:schemeClr>
                         </a:solidFill>
                         <a:effectLst/>
                         <a:latin typeface="Consolas" panose="020B0609020204030204" pitchFamily="49" charset="0"/>
@@ -11378,18 +11382,14 @@
                       <a:tailEnd type="none" w="med" len="med"/>
                     </a:lnR>
                     <a:lnT w="19050" cap="flat" cmpd="sng" algn="ctr">
-                      <a:solidFill>
-                        <a:schemeClr val="tx1"/>
-                      </a:solidFill>
+                      <a:noFill/>
                       <a:prstDash val="solid"/>
                       <a:round/>
                       <a:headEnd type="none" w="med" len="med"/>
                       <a:tailEnd type="none" w="med" len="med"/>
                     </a:lnT>
                     <a:lnB w="19050" cap="flat" cmpd="sng" algn="ctr">
-                      <a:solidFill>
-                        <a:schemeClr val="tx1"/>
-                      </a:solidFill>
+                      <a:noFill/>
                       <a:prstDash val="solid"/>
                       <a:round/>
                       <a:headEnd type="none" w="med" len="med"/>
@@ -12174,7 +12174,9 @@
                             <a:noFill/>
                           </a:ln>
                           <a:solidFill>
-                            <a:prstClr val="black"/>
+                            <a:schemeClr val="bg1">
+                              <a:lumMod val="50000"/>
+                            </a:schemeClr>
                           </a:solidFill>
                           <a:effectLst/>
                           <a:uLnTx/>
@@ -12187,7 +12189,9 @@
                       </a:r>
                       <a:endParaRPr lang="it-IT" sz="1100" b="0" i="0" u="none" strike="noStrike" dirty="0">
                         <a:solidFill>
-                          <a:srgbClr val="000000"/>
+                          <a:schemeClr val="bg1">
+                            <a:lumMod val="50000"/>
+                          </a:schemeClr>
                         </a:solidFill>
                         <a:effectLst/>
                         <a:latin typeface="Consolas" panose="020B0609020204030204" pitchFamily="49" charset="0"/>
@@ -12214,18 +12218,14 @@
                       <a:tailEnd type="none" w="med" len="med"/>
                     </a:lnR>
                     <a:lnT w="19050" cap="flat" cmpd="sng" algn="ctr">
-                      <a:solidFill>
-                        <a:schemeClr val="tx1"/>
-                      </a:solidFill>
+                      <a:noFill/>
                       <a:prstDash val="solid"/>
                       <a:round/>
                       <a:headEnd type="none" w="med" len="med"/>
                       <a:tailEnd type="none" w="med" len="med"/>
                     </a:lnT>
                     <a:lnB w="19050" cap="flat" cmpd="sng" algn="ctr">
-                      <a:solidFill>
-                        <a:schemeClr val="tx1"/>
-                      </a:solidFill>
+                      <a:noFill/>
                       <a:prstDash val="solid"/>
                       <a:round/>
                       <a:headEnd type="none" w="med" len="med"/>
@@ -13135,7 +13135,9 @@
                             <a:noFill/>
                           </a:ln>
                           <a:solidFill>
-                            <a:prstClr val="black"/>
+                            <a:schemeClr val="bg1">
+                              <a:lumMod val="50000"/>
+                            </a:schemeClr>
                           </a:solidFill>
                           <a:effectLst/>
                           <a:uLnTx/>
@@ -13148,7 +13150,9 @@
                       </a:r>
                       <a:endParaRPr lang="it-IT" sz="1100" b="0" i="0" u="none" strike="noStrike" dirty="0">
                         <a:solidFill>
-                          <a:srgbClr val="000000"/>
+                          <a:schemeClr val="bg1">
+                            <a:lumMod val="50000"/>
+                          </a:schemeClr>
                         </a:solidFill>
                         <a:effectLst/>
                         <a:latin typeface="Consolas" panose="020B0609020204030204" pitchFamily="49" charset="0"/>
@@ -13175,18 +13179,14 @@
                       <a:tailEnd type="none" w="med" len="med"/>
                     </a:lnR>
                     <a:lnT w="19050" cap="flat" cmpd="sng" algn="ctr">
-                      <a:solidFill>
-                        <a:schemeClr val="tx1"/>
-                      </a:solidFill>
+                      <a:noFill/>
                       <a:prstDash val="solid"/>
                       <a:round/>
                       <a:headEnd type="none" w="med" len="med"/>
                       <a:tailEnd type="none" w="med" len="med"/>
                     </a:lnT>
                     <a:lnB w="19050" cap="flat" cmpd="sng" algn="ctr">
-                      <a:solidFill>
-                        <a:schemeClr val="tx1"/>
-                      </a:solidFill>
+                      <a:noFill/>
                       <a:prstDash val="solid"/>
                       <a:round/>
                       <a:headEnd type="none" w="med" len="med"/>
@@ -14096,7 +14096,9 @@
                             <a:noFill/>
                           </a:ln>
                           <a:solidFill>
-                            <a:prstClr val="black"/>
+                            <a:schemeClr val="bg1">
+                              <a:lumMod val="50000"/>
+                            </a:schemeClr>
                           </a:solidFill>
                           <a:effectLst/>
                           <a:uLnTx/>
@@ -14109,7 +14111,9 @@
                       </a:r>
                       <a:endParaRPr lang="it-IT" sz="1100" b="0" i="0" u="none" strike="noStrike" dirty="0">
                         <a:solidFill>
-                          <a:srgbClr val="000000"/>
+                          <a:schemeClr val="bg1">
+                            <a:lumMod val="50000"/>
+                          </a:schemeClr>
                         </a:solidFill>
                         <a:effectLst/>
                         <a:latin typeface="Consolas" panose="020B0609020204030204" pitchFamily="49" charset="0"/>
@@ -14136,18 +14140,14 @@
                       <a:tailEnd type="none" w="med" len="med"/>
                     </a:lnR>
                     <a:lnT w="19050" cap="flat" cmpd="sng" algn="ctr">
-                      <a:solidFill>
-                        <a:schemeClr val="tx1"/>
-                      </a:solidFill>
+                      <a:noFill/>
                       <a:prstDash val="solid"/>
                       <a:round/>
                       <a:headEnd type="none" w="med" len="med"/>
                       <a:tailEnd type="none" w="med" len="med"/>
                     </a:lnT>
                     <a:lnB w="19050" cap="flat" cmpd="sng" algn="ctr">
-                      <a:solidFill>
-                        <a:schemeClr val="tx1"/>
-                      </a:solidFill>
+                      <a:noFill/>
                       <a:prstDash val="solid"/>
                       <a:round/>
                       <a:headEnd type="none" w="med" len="med"/>
@@ -15057,7 +15057,9 @@
                             <a:noFill/>
                           </a:ln>
                           <a:solidFill>
-                            <a:prstClr val="black"/>
+                            <a:schemeClr val="bg1">
+                              <a:lumMod val="50000"/>
+                            </a:schemeClr>
                           </a:solidFill>
                           <a:effectLst/>
                           <a:uLnTx/>
@@ -15070,7 +15072,9 @@
                       </a:r>
                       <a:endParaRPr lang="it-IT" sz="1100" b="0" i="0" u="none" strike="noStrike" dirty="0">
                         <a:solidFill>
-                          <a:srgbClr val="000000"/>
+                          <a:schemeClr val="bg1">
+                            <a:lumMod val="50000"/>
+                          </a:schemeClr>
                         </a:solidFill>
                         <a:effectLst/>
                         <a:latin typeface="Consolas" panose="020B0609020204030204" pitchFamily="49" charset="0"/>
@@ -15097,18 +15101,14 @@
                       <a:tailEnd type="none" w="med" len="med"/>
                     </a:lnR>
                     <a:lnT w="19050" cap="flat" cmpd="sng" algn="ctr">
-                      <a:solidFill>
-                        <a:schemeClr val="tx1"/>
-                      </a:solidFill>
+                      <a:noFill/>
                       <a:prstDash val="solid"/>
                       <a:round/>
                       <a:headEnd type="none" w="med" len="med"/>
                       <a:tailEnd type="none" w="med" len="med"/>
                     </a:lnT>
                     <a:lnB w="19050" cap="flat" cmpd="sng" algn="ctr">
-                      <a:solidFill>
-                        <a:schemeClr val="tx1"/>
-                      </a:solidFill>
+                      <a:noFill/>
                       <a:prstDash val="solid"/>
                       <a:round/>
                       <a:headEnd type="none" w="med" len="med"/>

</xml_diff>